<commit_message>
Ajustes interface e apresentação
</commit_message>
<xml_diff>
--- a/Apresentação.pptx
+++ b/Apresentação.pptx
@@ -9,7 +9,12 @@
     <p:sldId id="258" r:id="rId3"/>
     <p:sldId id="269" r:id="rId4"/>
     <p:sldId id="270" r:id="rId5"/>
-    <p:sldId id="268" r:id="rId6"/>
+    <p:sldId id="274" r:id="rId6"/>
+    <p:sldId id="273" r:id="rId7"/>
+    <p:sldId id="272" r:id="rId8"/>
+    <p:sldId id="271" r:id="rId9"/>
+    <p:sldId id="275" r:id="rId10"/>
+    <p:sldId id="268" r:id="rId11"/>
   </p:sldIdLst>
   <p:sldSz cx="9144000" cy="6858000" type="screen4x3"/>
   <p:notesSz cx="9144000" cy="6858000"/>
@@ -266,7 +271,7 @@
           <a:p>
             <a:fld id="{1D8BD707-D9CF-40AE-B4C6-C98DA3205C09}" type="datetimeFigureOut">
               <a:rPr lang="en-US"/>
-              <a:t>6/11/2019</a:t>
+              <a:t>2/13/2022</a:t>
             </a:fld>
             <a:endParaRPr lang="en-US"/>
           </a:p>
@@ -443,7 +448,7 @@
           <a:p>
             <a:fld id="{1D8BD707-D9CF-40AE-B4C6-C98DA3205C09}" type="datetimeFigureOut">
               <a:rPr lang="en-US"/>
-              <a:t>6/11/2019</a:t>
+              <a:t>2/13/2022</a:t>
             </a:fld>
             <a:endParaRPr lang="en-US"/>
           </a:p>
@@ -657,7 +662,7 @@
           <a:p>
             <a:fld id="{1D8BD707-D9CF-40AE-B4C6-C98DA3205C09}" type="datetimeFigureOut">
               <a:rPr lang="en-US"/>
-              <a:t>6/11/2019</a:t>
+              <a:t>2/13/2022</a:t>
             </a:fld>
             <a:endParaRPr lang="en-US"/>
           </a:p>
@@ -805,7 +810,7 @@
           <a:p>
             <a:fld id="{1D8BD707-D9CF-40AE-B4C6-C98DA3205C09}" type="datetimeFigureOut">
               <a:rPr lang="en-US"/>
-              <a:t>6/11/2019</a:t>
+              <a:t>2/13/2022</a:t>
             </a:fld>
             <a:endParaRPr lang="en-US"/>
           </a:p>
@@ -924,7 +929,7 @@
           <a:p>
             <a:fld id="{1D8BD707-D9CF-40AE-B4C6-C98DA3205C09}" type="datetimeFigureOut">
               <a:rPr lang="en-US"/>
-              <a:t>6/11/2019</a:t>
+              <a:t>2/13/2022</a:t>
             </a:fld>
             <a:endParaRPr lang="en-US"/>
           </a:p>
@@ -1199,7 +1204,7 @@
           <a:p>
             <a:fld id="{1D8BD707-D9CF-40AE-B4C6-C98DA3205C09}" type="datetimeFigureOut">
               <a:rPr lang="en-US"/>
-              <a:t>6/11/2019</a:t>
+              <a:t>2/13/2022</a:t>
             </a:fld>
             <a:endParaRPr lang="en-US"/>
           </a:p>
@@ -1481,21 +1486,7 @@
                 <a:latin typeface="Verdana"/>
                 <a:cs typeface="Verdana"/>
               </a:rPr>
-              <a:t>Nome dos</a:t>
-            </a:r>
-            <a:r>
-              <a:rPr sz="1550" spc="-5" dirty="0">
-                <a:latin typeface="Verdana"/>
-                <a:cs typeface="Verdana"/>
-              </a:rPr>
-              <a:t> </a:t>
-            </a:r>
-            <a:r>
-              <a:rPr lang="pt-BR" sz="1550" spc="10" dirty="0">
-                <a:latin typeface="Verdana"/>
-                <a:cs typeface="Verdana"/>
-              </a:rPr>
-              <a:t>aluno</a:t>
+              <a:t>Robson de Jesus</a:t>
             </a:r>
             <a:endParaRPr sz="1550" dirty="0">
               <a:latin typeface="Verdana"/>
@@ -1539,7 +1530,7 @@
             </a:pPr>
             <a:r>
               <a:rPr lang="pt-BR" sz="2400" spc="-15" dirty="0"/>
-              <a:t>Nome trabalho</a:t>
+              <a:t>Trabalho final CHAT</a:t>
             </a:r>
             <a:endParaRPr sz="2400" dirty="0"/>
           </a:p>
@@ -1590,6 +1581,640 @@
           </a:prstGeom>
           <a:blipFill>
             <a:blip r:embed="rId4" cstate="print"/>
+            <a:stretch>
+              <a:fillRect/>
+            </a:stretch>
+          </a:blipFill>
+        </p:spPr>
+        <p:txBody>
+          <a:bodyPr wrap="square" lIns="0" tIns="0" rIns="0" bIns="0" rtlCol="0"/>
+          <a:lstStyle/>
+          <a:p>
+            <a:endParaRPr/>
+          </a:p>
+        </p:txBody>
+      </p:sp>
+    </p:spTree>
+  </p:cSld>
+  <p:clrMapOvr>
+    <a:masterClrMapping/>
+  </p:clrMapOvr>
+</p:sld>
+</file>
+
+<file path=ppt/slides/slide10.xml><?xml version="1.0" encoding="utf-8"?>
+<p:sld xmlns:a="http://schemas.openxmlformats.org/drawingml/2006/main" xmlns:r="http://schemas.openxmlformats.org/officeDocument/2006/relationships" xmlns:p="http://schemas.openxmlformats.org/presentationml/2006/main">
+  <p:cSld>
+    <p:spTree>
+      <p:nvGrpSpPr>
+        <p:cNvPr id="1" name=""/>
+        <p:cNvGrpSpPr/>
+        <p:nvPr/>
+      </p:nvGrpSpPr>
+      <p:grpSpPr>
+        <a:xfrm>
+          <a:off x="0" y="0"/>
+          <a:ext cx="0" cy="0"/>
+          <a:chOff x="0" y="0"/>
+          <a:chExt cx="0" cy="0"/>
+        </a:xfrm>
+      </p:grpSpPr>
+      <p:sp>
+        <p:nvSpPr>
+          <p:cNvPr id="2" name="object 2"/>
+          <p:cNvSpPr/>
+          <p:nvPr/>
+        </p:nvSpPr>
+        <p:spPr>
+          <a:xfrm>
+            <a:off x="285750" y="6381750"/>
+            <a:ext cx="1676400" cy="295275"/>
+          </a:xfrm>
+          <a:prstGeom prst="rect">
+            <a:avLst/>
+          </a:prstGeom>
+          <a:blipFill>
+            <a:blip r:embed="rId2" cstate="print"/>
+            <a:stretch>
+              <a:fillRect/>
+            </a:stretch>
+          </a:blipFill>
+        </p:spPr>
+        <p:txBody>
+          <a:bodyPr wrap="square" lIns="0" tIns="0" rIns="0" bIns="0" rtlCol="0"/>
+          <a:lstStyle/>
+          <a:p>
+            <a:endParaRPr/>
+          </a:p>
+        </p:txBody>
+      </p:sp>
+      <p:sp>
+        <p:nvSpPr>
+          <p:cNvPr id="3" name="object 3"/>
+          <p:cNvSpPr txBox="1">
+            <a:spLocks noGrp="1"/>
+          </p:cNvSpPr>
+          <p:nvPr>
+            <p:ph type="title"/>
+          </p:nvPr>
+        </p:nvSpPr>
+        <p:spPr>
+          <a:prstGeom prst="rect">
+            <a:avLst/>
+          </a:prstGeom>
+        </p:spPr>
+        <p:txBody>
+          <a:bodyPr vert="horz" wrap="square" lIns="0" tIns="16510" rIns="0" bIns="0" rtlCol="0">
+            <a:spAutoFit/>
+          </a:bodyPr>
+          <a:lstStyle/>
+          <a:p>
+            <a:pPr marL="2938780">
+              <a:lnSpc>
+                <a:spcPct val="100000"/>
+              </a:lnSpc>
+              <a:spcBef>
+                <a:spcPts val="130"/>
+              </a:spcBef>
+            </a:pPr>
+            <a:r>
+              <a:rPr spc="20" dirty="0"/>
+              <a:t>Ob</a:t>
+            </a:r>
+            <a:r>
+              <a:rPr spc="-30" dirty="0"/>
+              <a:t>r</a:t>
+            </a:r>
+            <a:r>
+              <a:rPr spc="10" dirty="0"/>
+              <a:t>i</a:t>
+            </a:r>
+            <a:r>
+              <a:rPr dirty="0"/>
+              <a:t>g</a:t>
+            </a:r>
+            <a:r>
+              <a:rPr spc="-15" dirty="0"/>
+              <a:t>a</a:t>
+            </a:r>
+            <a:r>
+              <a:rPr spc="15" dirty="0"/>
+              <a:t>do</a:t>
+            </a:r>
+          </a:p>
+        </p:txBody>
+      </p:sp>
+      <p:sp>
+        <p:nvSpPr>
+          <p:cNvPr id="4" name="object 4"/>
+          <p:cNvSpPr txBox="1"/>
+          <p:nvPr/>
+        </p:nvSpPr>
+        <p:spPr>
+          <a:xfrm>
+            <a:off x="4835144" y="2022157"/>
+            <a:ext cx="3598545" cy="3018790"/>
+          </a:xfrm>
+          <a:prstGeom prst="rect">
+            <a:avLst/>
+          </a:prstGeom>
+        </p:spPr>
+        <p:txBody>
+          <a:bodyPr vert="horz" wrap="square" lIns="0" tIns="26034" rIns="0" bIns="0" rtlCol="0">
+            <a:spAutoFit/>
+          </a:bodyPr>
+          <a:lstStyle/>
+          <a:p>
+            <a:pPr marL="12700" marR="5080">
+              <a:lnSpc>
+                <a:spcPts val="1650"/>
+              </a:lnSpc>
+              <a:spcBef>
+                <a:spcPts val="204"/>
+              </a:spcBef>
+            </a:pPr>
+            <a:r>
+              <a:rPr sz="1400" b="1" spc="20" dirty="0">
+                <a:latin typeface="Verdana"/>
+                <a:cs typeface="Verdana"/>
+              </a:rPr>
+              <a:t>UDESC</a:t>
+            </a:r>
+            <a:r>
+              <a:rPr sz="1400" b="1" spc="-95" dirty="0">
+                <a:latin typeface="Verdana"/>
+                <a:cs typeface="Verdana"/>
+              </a:rPr>
+              <a:t> </a:t>
+            </a:r>
+            <a:r>
+              <a:rPr sz="1400" b="1" spc="15" dirty="0">
+                <a:latin typeface="Verdana"/>
+                <a:cs typeface="Verdana"/>
+              </a:rPr>
+              <a:t>–</a:t>
+            </a:r>
+            <a:r>
+              <a:rPr sz="1400" b="1" spc="-75" dirty="0">
+                <a:latin typeface="Verdana"/>
+                <a:cs typeface="Verdana"/>
+              </a:rPr>
+              <a:t> </a:t>
+            </a:r>
+            <a:r>
+              <a:rPr sz="1400" b="1" spc="10" dirty="0">
+                <a:latin typeface="Verdana"/>
+                <a:cs typeface="Verdana"/>
+              </a:rPr>
+              <a:t>Universidade</a:t>
+            </a:r>
+            <a:r>
+              <a:rPr sz="1400" b="1" spc="-160" dirty="0">
+                <a:latin typeface="Verdana"/>
+                <a:cs typeface="Verdana"/>
+              </a:rPr>
+              <a:t> </a:t>
+            </a:r>
+            <a:r>
+              <a:rPr sz="1400" b="1" spc="5" dirty="0">
+                <a:latin typeface="Verdana"/>
+                <a:cs typeface="Verdana"/>
+              </a:rPr>
+              <a:t>do</a:t>
+            </a:r>
+            <a:r>
+              <a:rPr sz="1400" b="1" spc="-40" dirty="0">
+                <a:latin typeface="Verdana"/>
+                <a:cs typeface="Verdana"/>
+              </a:rPr>
+              <a:t> </a:t>
+            </a:r>
+            <a:r>
+              <a:rPr sz="1400" b="1" spc="15" dirty="0">
+                <a:latin typeface="Verdana"/>
+                <a:cs typeface="Verdana"/>
+              </a:rPr>
+              <a:t>Estado</a:t>
+            </a:r>
+            <a:r>
+              <a:rPr sz="1400" b="1" spc="-110" dirty="0">
+                <a:latin typeface="Verdana"/>
+                <a:cs typeface="Verdana"/>
+              </a:rPr>
+              <a:t> </a:t>
+            </a:r>
+            <a:r>
+              <a:rPr sz="1400" b="1" spc="5" dirty="0">
+                <a:latin typeface="Verdana"/>
+                <a:cs typeface="Verdana"/>
+              </a:rPr>
+              <a:t>de  </a:t>
+            </a:r>
+            <a:r>
+              <a:rPr sz="1400" b="1" spc="35" dirty="0">
+                <a:latin typeface="Verdana"/>
+                <a:cs typeface="Verdana"/>
+              </a:rPr>
+              <a:t>Santa</a:t>
+            </a:r>
+            <a:r>
+              <a:rPr sz="1400" b="1" spc="-165" dirty="0">
+                <a:latin typeface="Verdana"/>
+                <a:cs typeface="Verdana"/>
+              </a:rPr>
+              <a:t> </a:t>
+            </a:r>
+            <a:r>
+              <a:rPr sz="1400" b="1" spc="20" dirty="0">
+                <a:latin typeface="Verdana"/>
+                <a:cs typeface="Verdana"/>
+              </a:rPr>
+              <a:t>Catarina</a:t>
+            </a:r>
+            <a:endParaRPr sz="1400">
+              <a:latin typeface="Verdana"/>
+              <a:cs typeface="Verdana"/>
+            </a:endParaRPr>
+          </a:p>
+          <a:p>
+            <a:pPr marL="12700" marR="1199515">
+              <a:lnSpc>
+                <a:spcPts val="3379"/>
+              </a:lnSpc>
+              <a:spcBef>
+                <a:spcPts val="350"/>
+              </a:spcBef>
+            </a:pPr>
+            <a:r>
+              <a:rPr sz="1400" spc="10" dirty="0">
+                <a:latin typeface="Verdana"/>
+                <a:cs typeface="Verdana"/>
+                <a:hlinkClick r:id="rId3"/>
+              </a:rPr>
+              <a:t>c</a:t>
+            </a:r>
+            <a:r>
+              <a:rPr sz="1400" spc="45" dirty="0">
+                <a:latin typeface="Verdana"/>
+                <a:cs typeface="Verdana"/>
+                <a:hlinkClick r:id="rId3"/>
+              </a:rPr>
+              <a:t>o</a:t>
+            </a:r>
+            <a:r>
+              <a:rPr sz="1400" spc="15" dirty="0">
+                <a:latin typeface="Verdana"/>
+                <a:cs typeface="Verdana"/>
+                <a:hlinkClick r:id="rId3"/>
+              </a:rPr>
+              <a:t>n</a:t>
+            </a:r>
+            <a:r>
+              <a:rPr sz="1400" spc="-30" dirty="0">
+                <a:latin typeface="Verdana"/>
+                <a:cs typeface="Verdana"/>
+                <a:hlinkClick r:id="rId3"/>
+              </a:rPr>
+              <a:t>t</a:t>
+            </a:r>
+            <a:r>
+              <a:rPr sz="1400" spc="-15" dirty="0">
+                <a:latin typeface="Verdana"/>
+                <a:cs typeface="Verdana"/>
+                <a:hlinkClick r:id="rId3"/>
+              </a:rPr>
+              <a:t>a</a:t>
+            </a:r>
+            <a:r>
+              <a:rPr sz="1400" spc="-30" dirty="0">
+                <a:latin typeface="Verdana"/>
+                <a:cs typeface="Verdana"/>
+                <a:hlinkClick r:id="rId3"/>
+              </a:rPr>
+              <a:t>t</a:t>
+            </a:r>
+            <a:r>
+              <a:rPr sz="1400" spc="45" dirty="0">
+                <a:latin typeface="Verdana"/>
+                <a:cs typeface="Verdana"/>
+                <a:hlinkClick r:id="rId3"/>
+              </a:rPr>
+              <a:t>o</a:t>
+            </a:r>
+            <a:r>
+              <a:rPr sz="1400" spc="10" dirty="0">
+                <a:latin typeface="Verdana"/>
+                <a:cs typeface="Verdana"/>
+                <a:hlinkClick r:id="rId3"/>
+              </a:rPr>
+              <a:t>.u</a:t>
+            </a:r>
+            <a:r>
+              <a:rPr sz="1400" spc="25" dirty="0">
+                <a:latin typeface="Verdana"/>
+                <a:cs typeface="Verdana"/>
+                <a:hlinkClick r:id="rId3"/>
+              </a:rPr>
+              <a:t>d</a:t>
+            </a:r>
+            <a:r>
+              <a:rPr sz="1400" spc="-10" dirty="0">
+                <a:latin typeface="Verdana"/>
+                <a:cs typeface="Verdana"/>
+                <a:hlinkClick r:id="rId3"/>
+              </a:rPr>
+              <a:t>e</a:t>
+            </a:r>
+            <a:r>
+              <a:rPr sz="1400" spc="15" dirty="0">
+                <a:latin typeface="Verdana"/>
+                <a:cs typeface="Verdana"/>
+                <a:hlinkClick r:id="rId3"/>
+              </a:rPr>
+              <a:t>sc@</a:t>
+            </a:r>
+            <a:r>
+              <a:rPr sz="1400" spc="25" dirty="0">
+                <a:latin typeface="Verdana"/>
+                <a:cs typeface="Verdana"/>
+                <a:hlinkClick r:id="rId3"/>
+              </a:rPr>
+              <a:t>g</a:t>
+            </a:r>
+            <a:r>
+              <a:rPr sz="1400" spc="-15" dirty="0">
+                <a:latin typeface="Verdana"/>
+                <a:cs typeface="Verdana"/>
+                <a:hlinkClick r:id="rId3"/>
+              </a:rPr>
+              <a:t>mai</a:t>
+            </a:r>
+            <a:r>
+              <a:rPr sz="1400" spc="60" dirty="0">
+                <a:latin typeface="Verdana"/>
+                <a:cs typeface="Verdana"/>
+                <a:hlinkClick r:id="rId3"/>
+              </a:rPr>
+              <a:t>l</a:t>
+            </a:r>
+            <a:r>
+              <a:rPr sz="1400" spc="-60" dirty="0">
+                <a:latin typeface="Verdana"/>
+                <a:cs typeface="Verdana"/>
+                <a:hlinkClick r:id="rId3"/>
+              </a:rPr>
+              <a:t>.</a:t>
+            </a:r>
+            <a:r>
+              <a:rPr sz="1400" spc="10" dirty="0">
+                <a:latin typeface="Verdana"/>
+                <a:cs typeface="Verdana"/>
+                <a:hlinkClick r:id="rId3"/>
+              </a:rPr>
+              <a:t>c</a:t>
+            </a:r>
+            <a:r>
+              <a:rPr sz="1400" spc="-25" dirty="0">
+                <a:latin typeface="Verdana"/>
+                <a:cs typeface="Verdana"/>
+                <a:hlinkClick r:id="rId3"/>
+              </a:rPr>
+              <a:t>o</a:t>
+            </a:r>
+            <a:r>
+              <a:rPr sz="1400" spc="15" dirty="0">
+                <a:latin typeface="Verdana"/>
+                <a:cs typeface="Verdana"/>
+                <a:hlinkClick r:id="rId3"/>
+              </a:rPr>
+              <a:t>m </a:t>
+            </a:r>
+            <a:r>
+              <a:rPr sz="1400" spc="5" dirty="0">
+                <a:latin typeface="Verdana"/>
+                <a:cs typeface="Verdana"/>
+              </a:rPr>
+              <a:t> </a:t>
+            </a:r>
+            <a:r>
+              <a:rPr sz="1400" spc="15" dirty="0">
+                <a:latin typeface="Verdana"/>
+                <a:cs typeface="Verdana"/>
+                <a:hlinkClick r:id="rId4"/>
+              </a:rPr>
+              <a:t>www.udesc.br</a:t>
+            </a:r>
+            <a:endParaRPr sz="1400">
+              <a:latin typeface="Verdana"/>
+              <a:cs typeface="Verdana"/>
+            </a:endParaRPr>
+          </a:p>
+          <a:p>
+            <a:pPr marL="12700">
+              <a:lnSpc>
+                <a:spcPct val="100000"/>
+              </a:lnSpc>
+              <a:spcBef>
+                <a:spcPts val="1230"/>
+              </a:spcBef>
+            </a:pPr>
+            <a:r>
+              <a:rPr sz="1400" spc="5" dirty="0">
+                <a:latin typeface="Verdana"/>
+                <a:cs typeface="Verdana"/>
+                <a:hlinkClick r:id="rId5"/>
+              </a:rPr>
+              <a:t>www.facebook.com/udesc</a:t>
+            </a:r>
+            <a:endParaRPr sz="1400">
+              <a:latin typeface="Verdana"/>
+              <a:cs typeface="Verdana"/>
+            </a:endParaRPr>
+          </a:p>
+          <a:p>
+            <a:pPr>
+              <a:lnSpc>
+                <a:spcPct val="100000"/>
+              </a:lnSpc>
+              <a:spcBef>
+                <a:spcPts val="30"/>
+              </a:spcBef>
+            </a:pPr>
+            <a:endParaRPr sz="1450">
+              <a:latin typeface="Times New Roman"/>
+              <a:cs typeface="Times New Roman"/>
+            </a:endParaRPr>
+          </a:p>
+          <a:p>
+            <a:pPr marL="12700">
+              <a:lnSpc>
+                <a:spcPct val="100000"/>
+              </a:lnSpc>
+            </a:pPr>
+            <a:r>
+              <a:rPr sz="1400" spc="15" dirty="0">
+                <a:latin typeface="Verdana"/>
+                <a:cs typeface="Verdana"/>
+              </a:rPr>
+              <a:t>(48)</a:t>
+            </a:r>
+            <a:r>
+              <a:rPr sz="1400" spc="-100" dirty="0">
+                <a:latin typeface="Verdana"/>
+                <a:cs typeface="Verdana"/>
+              </a:rPr>
+              <a:t> </a:t>
+            </a:r>
+            <a:r>
+              <a:rPr sz="1400" spc="10" dirty="0">
+                <a:latin typeface="Verdana"/>
+                <a:cs typeface="Verdana"/>
+              </a:rPr>
+              <a:t>3664-8000</a:t>
+            </a:r>
+            <a:endParaRPr sz="1400">
+              <a:latin typeface="Verdana"/>
+              <a:cs typeface="Verdana"/>
+            </a:endParaRPr>
+          </a:p>
+          <a:p>
+            <a:pPr>
+              <a:lnSpc>
+                <a:spcPct val="100000"/>
+              </a:lnSpc>
+              <a:spcBef>
+                <a:spcPts val="55"/>
+              </a:spcBef>
+            </a:pPr>
+            <a:endParaRPr sz="1500">
+              <a:latin typeface="Times New Roman"/>
+              <a:cs typeface="Times New Roman"/>
+            </a:endParaRPr>
+          </a:p>
+          <a:p>
+            <a:pPr marL="12700" marR="93345">
+              <a:lnSpc>
+                <a:spcPts val="1650"/>
+              </a:lnSpc>
+            </a:pPr>
+            <a:r>
+              <a:rPr sz="1400" spc="10" dirty="0">
+                <a:latin typeface="Verdana"/>
+                <a:cs typeface="Verdana"/>
+              </a:rPr>
+              <a:t>Rua Madre </a:t>
+            </a:r>
+            <a:r>
+              <a:rPr sz="1400" dirty="0">
+                <a:latin typeface="Verdana"/>
+                <a:cs typeface="Verdana"/>
+              </a:rPr>
+              <a:t>Benvenuta, </a:t>
+            </a:r>
+            <a:r>
+              <a:rPr sz="1400" spc="5" dirty="0">
+                <a:latin typeface="Verdana"/>
+                <a:cs typeface="Verdana"/>
+              </a:rPr>
+              <a:t>2007,</a:t>
+            </a:r>
+            <a:r>
+              <a:rPr sz="1400" spc="-265" dirty="0">
+                <a:latin typeface="Verdana"/>
+                <a:cs typeface="Verdana"/>
+              </a:rPr>
+              <a:t> </a:t>
+            </a:r>
+            <a:r>
+              <a:rPr sz="1400" spc="5" dirty="0">
+                <a:latin typeface="Verdana"/>
+                <a:cs typeface="Verdana"/>
+              </a:rPr>
+              <a:t>Itacorubi  </a:t>
+            </a:r>
+            <a:r>
+              <a:rPr sz="1400" spc="15" dirty="0">
+                <a:latin typeface="Verdana"/>
+                <a:cs typeface="Verdana"/>
+              </a:rPr>
+              <a:t>Florianópolis </a:t>
+            </a:r>
+            <a:r>
+              <a:rPr sz="1400" spc="10" dirty="0">
+                <a:latin typeface="Verdana"/>
+                <a:cs typeface="Verdana"/>
+              </a:rPr>
+              <a:t>-</a:t>
+            </a:r>
+            <a:r>
+              <a:rPr sz="1400" spc="-295" dirty="0">
+                <a:latin typeface="Verdana"/>
+                <a:cs typeface="Verdana"/>
+              </a:rPr>
+              <a:t> </a:t>
+            </a:r>
+            <a:r>
+              <a:rPr sz="1400" spc="10" dirty="0">
+                <a:latin typeface="Verdana"/>
+                <a:cs typeface="Verdana"/>
+              </a:rPr>
+              <a:t>SC</a:t>
+            </a:r>
+            <a:endParaRPr sz="1400">
+              <a:latin typeface="Verdana"/>
+              <a:cs typeface="Verdana"/>
+            </a:endParaRPr>
+          </a:p>
+          <a:p>
+            <a:pPr marL="12700">
+              <a:lnSpc>
+                <a:spcPct val="100000"/>
+              </a:lnSpc>
+            </a:pPr>
+            <a:r>
+              <a:rPr sz="1400" spc="5" dirty="0">
+                <a:latin typeface="Verdana"/>
+                <a:cs typeface="Verdana"/>
+              </a:rPr>
+              <a:t>CEP</a:t>
+            </a:r>
+            <a:r>
+              <a:rPr sz="1400" spc="-10" dirty="0">
+                <a:latin typeface="Verdana"/>
+                <a:cs typeface="Verdana"/>
+              </a:rPr>
+              <a:t> </a:t>
+            </a:r>
+            <a:r>
+              <a:rPr sz="1400" spc="10" dirty="0">
+                <a:latin typeface="Verdana"/>
+                <a:cs typeface="Verdana"/>
+              </a:rPr>
+              <a:t>88035-901</a:t>
+            </a:r>
+            <a:endParaRPr sz="1400">
+              <a:latin typeface="Verdana"/>
+              <a:cs typeface="Verdana"/>
+            </a:endParaRPr>
+          </a:p>
+        </p:txBody>
+      </p:sp>
+      <p:sp>
+        <p:nvSpPr>
+          <p:cNvPr id="5" name="object 5"/>
+          <p:cNvSpPr/>
+          <p:nvPr/>
+        </p:nvSpPr>
+        <p:spPr>
+          <a:xfrm>
+            <a:off x="0" y="190500"/>
+            <a:ext cx="4048125" cy="6667500"/>
+          </a:xfrm>
+          <a:prstGeom prst="rect">
+            <a:avLst/>
+          </a:prstGeom>
+          <a:blipFill>
+            <a:blip r:embed="rId6" cstate="print"/>
             <a:stretch>
               <a:fillRect/>
             </a:stretch>
@@ -1669,8 +2294,8 @@
         </p:nvSpPr>
         <p:spPr>
           <a:xfrm>
-            <a:off x="472757" y="367030"/>
-            <a:ext cx="2019300" cy="567463"/>
+            <a:off x="472756" y="367030"/>
+            <a:ext cx="9128443" cy="567463"/>
           </a:xfrm>
           <a:prstGeom prst="rect">
             <a:avLst/>
@@ -1691,8 +2316,8 @@
               </a:spcBef>
             </a:pPr>
             <a:r>
-              <a:rPr lang="pt-BR" sz="3600" b="0" spc="-5" dirty="0"/>
-              <a:t>Assunto</a:t>
+              <a:rPr lang="pt-BR" sz="3600" spc="-5" dirty="0"/>
+              <a:t>Descrição geral do sistema </a:t>
             </a:r>
             <a:endParaRPr sz="3600" dirty="0">
               <a:latin typeface="Verdana"/>
@@ -1760,7 +2385,7 @@
         <p:spPr>
           <a:xfrm>
             <a:off x="690880" y="1725231"/>
-            <a:ext cx="7609840" cy="290464"/>
+            <a:ext cx="7609840" cy="1726755"/>
           </a:xfrm>
           <a:prstGeom prst="rect">
             <a:avLst/>
@@ -1791,8 +2416,85 @@
                 <a:latin typeface="Verdana"/>
                 <a:cs typeface="Verdana"/>
               </a:rPr>
-              <a:t>XXXXXXXXXXXXXXXXXXXXXXXXXXXXXXXXXXXXXXXX</a:t>
-            </a:r>
+              <a:t>Objetivo do trabalho era desenvolver um sistema de troca de mensagens privado(CHAT)</a:t>
+            </a:r>
+          </a:p>
+          <a:p>
+            <a:pPr marL="298450" marR="180340" indent="-286385">
+              <a:lnSpc>
+                <a:spcPct val="99700"/>
+              </a:lnSpc>
+              <a:spcBef>
+                <a:spcPts val="105"/>
+              </a:spcBef>
+              <a:buFont typeface="Arial"/>
+              <a:buChar char="•"/>
+              <a:tabLst>
+                <a:tab pos="298450" algn="l"/>
+                <a:tab pos="299085" algn="l"/>
+              </a:tabLst>
+            </a:pPr>
+            <a:endParaRPr lang="pt-BR" dirty="0">
+              <a:latin typeface="Verdana"/>
+              <a:cs typeface="Verdana"/>
+            </a:endParaRPr>
+          </a:p>
+          <a:p>
+            <a:pPr marL="298450" marR="180340" indent="-286385">
+              <a:lnSpc>
+                <a:spcPct val="99700"/>
+              </a:lnSpc>
+              <a:spcBef>
+                <a:spcPts val="105"/>
+              </a:spcBef>
+              <a:buFont typeface="Arial"/>
+              <a:buChar char="•"/>
+              <a:tabLst>
+                <a:tab pos="298450" algn="l"/>
+                <a:tab pos="299085" algn="l"/>
+              </a:tabLst>
+            </a:pPr>
+            <a:r>
+              <a:rPr lang="pt-BR" sz="1800" dirty="0">
+                <a:latin typeface="Verdana"/>
+                <a:cs typeface="Verdana"/>
+              </a:rPr>
+              <a:t>Essa aplicação deve suportar múltiplos usuários conectados </a:t>
+            </a:r>
+          </a:p>
+          <a:p>
+            <a:pPr marL="298450" marR="180340" indent="-286385">
+              <a:lnSpc>
+                <a:spcPct val="99700"/>
+              </a:lnSpc>
+              <a:spcBef>
+                <a:spcPts val="105"/>
+              </a:spcBef>
+              <a:buFont typeface="Arial"/>
+              <a:buChar char="•"/>
+              <a:tabLst>
+                <a:tab pos="298450" algn="l"/>
+                <a:tab pos="299085" algn="l"/>
+              </a:tabLst>
+            </a:pPr>
+            <a:endParaRPr lang="pt-BR" dirty="0">
+              <a:latin typeface="Verdana"/>
+              <a:cs typeface="Verdana"/>
+            </a:endParaRPr>
+          </a:p>
+          <a:p>
+            <a:pPr marL="12065" marR="180340">
+              <a:lnSpc>
+                <a:spcPct val="99700"/>
+              </a:lnSpc>
+              <a:spcBef>
+                <a:spcPts val="105"/>
+              </a:spcBef>
+              <a:tabLst>
+                <a:tab pos="298450" algn="l"/>
+                <a:tab pos="299085" algn="l"/>
+              </a:tabLst>
+            </a:pPr>
             <a:endParaRPr sz="1800" dirty="0">
               <a:latin typeface="Verdana"/>
               <a:cs typeface="Verdana"/>
@@ -1800,6 +2502,36 @@
           </a:p>
         </p:txBody>
       </p:sp>
+      <p:pic>
+        <p:nvPicPr>
+          <p:cNvPr id="6" name="Imagem 5">
+            <a:extLst>
+              <a:ext uri="{FF2B5EF4-FFF2-40B4-BE49-F238E27FC236}">
+                <a16:creationId xmlns:a16="http://schemas.microsoft.com/office/drawing/2014/main" id="{0F8B3100-3304-4F3E-A484-7C8593E13764}"/>
+              </a:ext>
+            </a:extLst>
+          </p:cNvPr>
+          <p:cNvPicPr>
+            <a:picLocks noChangeAspect="1"/>
+          </p:cNvPicPr>
+          <p:nvPr/>
+        </p:nvPicPr>
+        <p:blipFill>
+          <a:blip r:embed="rId3"/>
+          <a:stretch>
+            <a:fillRect/>
+          </a:stretch>
+        </p:blipFill>
+        <p:spPr>
+          <a:xfrm>
+            <a:off x="3657600" y="3451986"/>
+            <a:ext cx="4967288" cy="2712946"/>
+          </a:xfrm>
+          <a:prstGeom prst="rect">
+            <a:avLst/>
+          </a:prstGeom>
+        </p:spPr>
+      </p:pic>
     </p:spTree>
   </p:cSld>
   <p:clrMapOvr>
@@ -1866,8 +2598,8 @@
         </p:nvSpPr>
         <p:spPr>
           <a:xfrm>
-            <a:off x="472757" y="367030"/>
-            <a:ext cx="2019300" cy="567463"/>
+            <a:off x="472756" y="367030"/>
+            <a:ext cx="8214043" cy="1121461"/>
           </a:xfrm>
           <a:prstGeom prst="rect">
             <a:avLst/>
@@ -1888,9 +2620,12 @@
               </a:spcBef>
             </a:pPr>
             <a:r>
-              <a:rPr lang="pt-BR" sz="3600" b="0" spc="-5" dirty="0"/>
-              <a:t>Assunto</a:t>
-            </a:r>
+              <a:rPr lang="pt-BR" sz="3600" spc="-5" dirty="0"/>
+              <a:t>Requisitos Funcionais</a:t>
+            </a:r>
+            <a:br>
+              <a:rPr lang="pt-BR" sz="3600" spc="-5" dirty="0"/>
+            </a:br>
             <a:endParaRPr sz="3600" dirty="0">
               <a:latin typeface="Verdana"/>
               <a:cs typeface="Verdana"/>
@@ -1957,7 +2692,7 @@
         <p:spPr>
           <a:xfrm>
             <a:off x="690880" y="1725231"/>
-            <a:ext cx="7609840" cy="290464"/>
+            <a:ext cx="7609840" cy="3891450"/>
           </a:xfrm>
           <a:prstGeom prst="rect">
             <a:avLst/>
@@ -1984,11 +2719,83 @@
               </a:tabLst>
             </a:pPr>
             <a:r>
-              <a:rPr lang="pt-BR" sz="1800" dirty="0">
-                <a:latin typeface="Verdana"/>
-                <a:cs typeface="Verdana"/>
-              </a:rPr>
-              <a:t>XXXXXXXXXXXXXXXXXXXXXXXXXXXXXXXXXXXXXXXX</a:t>
+              <a:rPr lang="pt-BR" b="1" dirty="0"/>
+              <a:t>[RF01]</a:t>
+            </a:r>
+            <a:r>
+              <a:rPr lang="pt-BR" dirty="0"/>
+              <a:t> - O sistema deve permitir a verificação do usuário ao fazer o login (Porta, endereço)</a:t>
+            </a:r>
+            <a:br>
+              <a:rPr lang="pt-BR" dirty="0"/>
+            </a:br>
+            <a:r>
+              <a:rPr lang="pt-BR" b="1" dirty="0"/>
+              <a:t>[RF02]</a:t>
+            </a:r>
+            <a:r>
+              <a:rPr lang="pt-BR" dirty="0"/>
+              <a:t> – O sistema deve permitir o envio de mensagens entre os usuários, a comunicação será direta entre cada usuário, logo será de forma privada.</a:t>
+            </a:r>
+            <a:br>
+              <a:rPr lang="pt-BR" dirty="0"/>
+            </a:br>
+            <a:r>
+              <a:rPr lang="pt-BR" b="1" dirty="0"/>
+              <a:t>[RF03]</a:t>
+            </a:r>
+            <a:r>
+              <a:rPr lang="pt-BR" dirty="0"/>
+              <a:t> - O sistema deve ter um mecanismo para retorna um erro de execução se o Server não estiver em execução.</a:t>
+            </a:r>
+            <a:br>
+              <a:rPr lang="pt-BR" dirty="0"/>
+            </a:br>
+            <a:r>
+              <a:rPr lang="pt-BR" b="1" dirty="0"/>
+              <a:t>[RF04]</a:t>
+            </a:r>
+            <a:r>
+              <a:rPr lang="pt-BR" dirty="0"/>
+              <a:t> - O sistema deve ter em cada tela ao entrar no sistema o nome especificado do cliente que acabou de </a:t>
+            </a:r>
+            <a:r>
+              <a:rPr lang="pt-BR" dirty="0" err="1"/>
+              <a:t>logar</a:t>
+            </a:r>
+            <a:r>
+              <a:rPr lang="pt-BR" dirty="0"/>
+              <a:t> no sistema.</a:t>
+            </a:r>
+            <a:br>
+              <a:rPr lang="pt-BR" dirty="0"/>
+            </a:br>
+            <a:r>
+              <a:rPr lang="pt-BR" b="1" dirty="0"/>
+              <a:t>[RF05]</a:t>
+            </a:r>
+            <a:r>
+              <a:rPr lang="pt-BR" dirty="0"/>
+              <a:t> - O sistema deve ter um botão para sempre atualizar a lista de usuários </a:t>
+            </a:r>
+            <a:r>
+              <a:rPr lang="pt-BR" dirty="0" err="1"/>
+              <a:t>onlines</a:t>
+            </a:r>
+            <a:r>
+              <a:rPr lang="pt-BR" dirty="0"/>
+              <a:t> no momento. Assim vamos conseguir ter a informação do nome e a rede que esse usuário está.</a:t>
+            </a:r>
+            <a:br>
+              <a:rPr lang="pt-BR" dirty="0"/>
+            </a:br>
+            <a:r>
+              <a:rPr lang="pt-BR" b="1" dirty="0"/>
+              <a:t>[RF06]</a:t>
+            </a:r>
+            <a:r>
+              <a:rPr lang="pt-BR" dirty="0"/>
+              <a:t> - O sistema ao iniciar uma conversa com outro usuário deve abrir duas janelas de chat, uma para quem inicio a conversa e outra para quem está sendo solicitado no momento da conversa.</a:t>
             </a:r>
             <a:endParaRPr sz="1800" dirty="0">
               <a:latin typeface="Verdana"/>
@@ -2068,8 +2875,8 @@
         </p:nvSpPr>
         <p:spPr>
           <a:xfrm>
-            <a:off x="472757" y="367030"/>
-            <a:ext cx="2019300" cy="567463"/>
+            <a:off x="472756" y="367030"/>
+            <a:ext cx="7756843" cy="567463"/>
           </a:xfrm>
           <a:prstGeom prst="rect">
             <a:avLst/>
@@ -2090,8 +2897,8 @@
               </a:spcBef>
             </a:pPr>
             <a:r>
-              <a:rPr lang="pt-BR" sz="3600" b="0" spc="-5" dirty="0"/>
-              <a:t>Assunto</a:t>
+              <a:rPr lang="pt-BR" sz="3600" spc="-5" dirty="0"/>
+              <a:t>Requisitos não Funcionais </a:t>
             </a:r>
             <a:endParaRPr sz="3600" dirty="0">
               <a:latin typeface="Verdana"/>
@@ -2159,7 +2966,7 @@
         <p:spPr>
           <a:xfrm>
             <a:off x="690880" y="1725231"/>
-            <a:ext cx="7609840" cy="290464"/>
+            <a:ext cx="7609840" cy="4827604"/>
           </a:xfrm>
           <a:prstGeom prst="rect">
             <a:avLst/>
@@ -2170,6 +2977,134 @@
             <a:spAutoFit/>
           </a:bodyPr>
           <a:lstStyle/>
+          <a:p>
+            <a:r>
+              <a:rPr lang="pt-BR" sz="1400" b="1" dirty="0"/>
+              <a:t>[RNF1]</a:t>
+            </a:r>
+            <a:r>
+              <a:rPr lang="pt-BR" sz="1400" dirty="0"/>
+              <a:t> - Deve ser distribuído e executar simultaneamente em no mínimo 3 clientes (hosts) diferentes.</a:t>
+            </a:r>
+          </a:p>
+          <a:p>
+            <a:r>
+              <a:rPr lang="pt-BR" sz="1400" b="1" dirty="0"/>
+              <a:t>[RNF2]</a:t>
+            </a:r>
+            <a:r>
+              <a:rPr lang="pt-BR" sz="1400" dirty="0"/>
+              <a:t> - Se necessário, pode ser implementado um servidor para ser acessado pelos clientes.</a:t>
+            </a:r>
+            <a:br>
+              <a:rPr lang="pt-BR" sz="1400" dirty="0"/>
+            </a:br>
+            <a:endParaRPr lang="pt-BR" sz="1400" dirty="0"/>
+          </a:p>
+          <a:p>
+            <a:r>
+              <a:rPr lang="pt-BR" sz="1400" dirty="0"/>
+              <a:t>a) Este servidor jamais deve criar conexões com clientes, apenas receber conexões. X</a:t>
+            </a:r>
+          </a:p>
+          <a:p>
+            <a:r>
+              <a:rPr lang="pt-BR" sz="1400" dirty="0"/>
+              <a:t>b) Não se deve utilizar nenhuma implementação pronta de qualquer servidor (</a:t>
+            </a:r>
+            <a:r>
+              <a:rPr lang="pt-BR" sz="1400" dirty="0" err="1"/>
+              <a:t>ex</a:t>
+            </a:r>
+            <a:r>
+              <a:rPr lang="pt-BR" sz="1400" dirty="0"/>
+              <a:t>: Express JS). Em caso de dúvida, consulte o professor.</a:t>
+            </a:r>
+          </a:p>
+          <a:p>
+            <a:r>
+              <a:rPr lang="pt-BR" sz="1400" b="1" dirty="0"/>
+              <a:t>[RNF3]</a:t>
+            </a:r>
+            <a:r>
+              <a:rPr lang="pt-BR" sz="1400" dirty="0"/>
+              <a:t> - A comunicação pode ser realizada através de (a equipe escolhe a opção desejada):</a:t>
+            </a:r>
+          </a:p>
+          <a:p>
+            <a:r>
+              <a:rPr lang="pt-BR" sz="1400" dirty="0"/>
+              <a:t>a) Sockets; ou</a:t>
+            </a:r>
+          </a:p>
+          <a:p>
+            <a:r>
+              <a:rPr lang="pt-BR" sz="1400" dirty="0"/>
+              <a:t>b) RMI. Ler seções 5.4 e 5.5 de (COULOURIS, DOLLIMORE, et al., 2013); ou</a:t>
+            </a:r>
+          </a:p>
+          <a:p>
+            <a:r>
+              <a:rPr lang="pt-BR" sz="1400" dirty="0"/>
+              <a:t>c) CORBA. Ler seção 8.3 de (COULOURIS, DOLLIMORE, et al., 2013).</a:t>
+            </a:r>
+          </a:p>
+          <a:p>
+            <a:r>
+              <a:rPr lang="pt-BR" sz="1400" b="1" dirty="0"/>
+              <a:t>[RNF4]</a:t>
+            </a:r>
+            <a:r>
+              <a:rPr lang="pt-BR" sz="1400" dirty="0"/>
+              <a:t> - Se utilizar Sockets no RNF3, então deve-se observar os seguintes requisitos:</a:t>
+            </a:r>
+          </a:p>
+          <a:p>
+            <a:r>
+              <a:rPr lang="pt-BR" sz="1400" dirty="0"/>
+              <a:t>a) Sockets ociosos não podem existir (todos devem ser fechados logo após a comunicação).</a:t>
+            </a:r>
+          </a:p>
+          <a:p>
+            <a:r>
+              <a:rPr lang="pt-BR" sz="1400" dirty="0"/>
+              <a:t>b) Os dados enviados entre cliente/servidor e cliente/cliente podem estar no formato JSON ou XML. Não é permitido o uso de serialização de objetos.</a:t>
+            </a:r>
+          </a:p>
+          <a:p>
+            <a:r>
+              <a:rPr lang="pt-BR" sz="1400" b="1" dirty="0"/>
+              <a:t>[RNF5]</a:t>
+            </a:r>
+            <a:r>
+              <a:rPr lang="pt-BR" sz="1400" dirty="0"/>
+              <a:t> - A aplicação cliente deve ter interface gráfica.</a:t>
+            </a:r>
+          </a:p>
+          <a:p>
+            <a:pPr marL="342900" indent="-342900">
+              <a:buAutoNum type="alphaLcParenR"/>
+            </a:pPr>
+            <a:r>
+              <a:rPr lang="pt-BR" sz="1400" dirty="0"/>
+              <a:t>A equipe pode utilizar interface gráfica disponível em outros projetos, citando a fonte/projeto. MAS ATENÇÃO: o projeto utilizado como base não pode ser distribuído (não pode já ter comunicação entre clientes/servidores)</a:t>
+            </a:r>
+          </a:p>
+          <a:p>
+            <a:endParaRPr lang="pt-BR" sz="1400" dirty="0"/>
+          </a:p>
+          <a:p>
+            <a:r>
+              <a:rPr lang="pt-BR" sz="1400" b="1" dirty="0"/>
+              <a:t>Nos requisitos funcionais não fica claro se o sistema terá um módulo de servidor</a:t>
+            </a:r>
+          </a:p>
+          <a:p>
+            <a:r>
+              <a:rPr lang="pt-BR" sz="1400" b="1" dirty="0"/>
+              <a:t>(Sim existe um módulo de servidor que sempre ira ficar rodando, acessando os dados)</a:t>
+            </a:r>
+          </a:p>
           <a:p>
             <a:pPr marL="298450" marR="180340" indent="-286385">
               <a:lnSpc>
@@ -2185,13 +3120,6 @@
                 <a:tab pos="299085" algn="l"/>
               </a:tabLst>
             </a:pPr>
-            <a:r>
-              <a:rPr lang="pt-BR" sz="1800" dirty="0">
-                <a:latin typeface="Verdana"/>
-                <a:cs typeface="Verdana"/>
-              </a:rPr>
-              <a:t>XXXXXXXXXXXXXXXXXXXXXXXXXXXXXXXXXXXXXXXX</a:t>
-            </a:r>
             <a:endParaRPr sz="1800" dirty="0">
               <a:latin typeface="Verdana"/>
               <a:cs typeface="Verdana"/>
@@ -2269,576 +3197,1021 @@
           </p:nvPr>
         </p:nvSpPr>
         <p:spPr>
+          <a:xfrm>
+            <a:off x="472756" y="367030"/>
+            <a:ext cx="7071043" cy="1175322"/>
+          </a:xfrm>
           <a:prstGeom prst="rect">
             <a:avLst/>
           </a:prstGeom>
         </p:spPr>
         <p:txBody>
-          <a:bodyPr vert="horz" wrap="square" lIns="0" tIns="16510" rIns="0" bIns="0" rtlCol="0">
+          <a:bodyPr vert="horz" wrap="square" lIns="0" tIns="13335" rIns="0" bIns="0" rtlCol="0">
             <a:spAutoFit/>
           </a:bodyPr>
           <a:lstStyle/>
           <a:p>
-            <a:pPr marL="2938780">
-              <a:lnSpc>
-                <a:spcPct val="100000"/>
-              </a:lnSpc>
+            <a:pPr marL="12700">
               <a:spcBef>
-                <a:spcPts val="130"/>
+                <a:spcPts val="105"/>
               </a:spcBef>
             </a:pPr>
             <a:r>
-              <a:rPr spc="20" dirty="0"/>
-              <a:t>Ob</a:t>
-            </a:r>
-            <a:r>
-              <a:rPr spc="-30" dirty="0"/>
-              <a:t>r</a:t>
-            </a:r>
-            <a:r>
-              <a:rPr spc="10" dirty="0"/>
-              <a:t>i</a:t>
-            </a:r>
-            <a:r>
-              <a:rPr dirty="0"/>
-              <a:t>g</a:t>
-            </a:r>
-            <a:r>
-              <a:rPr spc="-15" dirty="0"/>
-              <a:t>a</a:t>
-            </a:r>
-            <a:r>
-              <a:rPr spc="15" dirty="0"/>
-              <a:t>do</a:t>
-            </a:r>
+              <a:rPr lang="pt-BR" dirty="0"/>
+              <a:t>Regras de Negócio</a:t>
+            </a:r>
+            <a:br>
+              <a:rPr lang="pt-BR" dirty="0"/>
+            </a:br>
+            <a:endParaRPr sz="3600" dirty="0">
+              <a:latin typeface="Verdana"/>
+              <a:cs typeface="Verdana"/>
+            </a:endParaRPr>
           </a:p>
         </p:txBody>
       </p:sp>
       <p:sp>
         <p:nvSpPr>
           <p:cNvPr id="4" name="object 4"/>
+          <p:cNvSpPr/>
+          <p:nvPr/>
+        </p:nvSpPr>
+        <p:spPr>
+          <a:xfrm>
+            <a:off x="0" y="476250"/>
+            <a:ext cx="285750" cy="361950"/>
+          </a:xfrm>
+          <a:custGeom>
+            <a:avLst/>
+            <a:gdLst/>
+            <a:ahLst/>
+            <a:cxnLst/>
+            <a:rect l="l" t="t" r="r" b="b"/>
+            <a:pathLst>
+              <a:path w="285750" h="361950">
+                <a:moveTo>
+                  <a:pt x="0" y="361950"/>
+                </a:moveTo>
+                <a:lnTo>
+                  <a:pt x="285750" y="361950"/>
+                </a:lnTo>
+                <a:lnTo>
+                  <a:pt x="285750" y="0"/>
+                </a:lnTo>
+                <a:lnTo>
+                  <a:pt x="0" y="0"/>
+                </a:lnTo>
+                <a:lnTo>
+                  <a:pt x="0" y="361950"/>
+                </a:lnTo>
+                <a:close/>
+              </a:path>
+            </a:pathLst>
+          </a:custGeom>
+          <a:solidFill>
+            <a:srgbClr val="139B54"/>
+          </a:solidFill>
+        </p:spPr>
+        <p:txBody>
+          <a:bodyPr wrap="square" lIns="0" tIns="0" rIns="0" bIns="0" rtlCol="0"/>
+          <a:lstStyle/>
+          <a:p>
+            <a:endParaRPr/>
+          </a:p>
+        </p:txBody>
+      </p:sp>
+      <p:sp>
+        <p:nvSpPr>
+          <p:cNvPr id="5" name="object 5"/>
           <p:cNvSpPr txBox="1"/>
           <p:nvPr/>
         </p:nvSpPr>
         <p:spPr>
           <a:xfrm>
-            <a:off x="4835144" y="2022157"/>
-            <a:ext cx="3598545" cy="3018790"/>
+            <a:off x="690880" y="1725231"/>
+            <a:ext cx="7609840" cy="3060453"/>
           </a:xfrm>
           <a:prstGeom prst="rect">
             <a:avLst/>
           </a:prstGeom>
         </p:spPr>
         <p:txBody>
-          <a:bodyPr vert="horz" wrap="square" lIns="0" tIns="26034" rIns="0" bIns="0" rtlCol="0">
+          <a:bodyPr vert="horz" wrap="square" lIns="0" tIns="13335" rIns="0" bIns="0" rtlCol="0">
             <a:spAutoFit/>
           </a:bodyPr>
           <a:lstStyle/>
           <a:p>
-            <a:pPr marL="12700" marR="5080">
+            <a:pPr marL="298450" marR="180340" indent="-286385">
               <a:lnSpc>
-                <a:spcPts val="1650"/>
+                <a:spcPct val="99700"/>
               </a:lnSpc>
               <a:spcBef>
-                <a:spcPts val="204"/>
+                <a:spcPts val="105"/>
               </a:spcBef>
+              <a:buFont typeface="Arial"/>
+              <a:buChar char="•"/>
+              <a:tabLst>
+                <a:tab pos="298450" algn="l"/>
+                <a:tab pos="299085" algn="l"/>
+              </a:tabLst>
             </a:pPr>
             <a:r>
-              <a:rPr sz="1400" b="1" spc="20" dirty="0">
-                <a:latin typeface="Verdana"/>
-                <a:cs typeface="Verdana"/>
-              </a:rPr>
-              <a:t>UDESC</a:t>
-            </a:r>
-            <a:r>
-              <a:rPr sz="1400" b="1" spc="-95" dirty="0">
-                <a:latin typeface="Verdana"/>
-                <a:cs typeface="Verdana"/>
-              </a:rPr>
-              <a:t> </a:t>
-            </a:r>
-            <a:r>
-              <a:rPr sz="1400" b="1" spc="15" dirty="0">
-                <a:latin typeface="Verdana"/>
-                <a:cs typeface="Verdana"/>
-              </a:rPr>
-              <a:t>–</a:t>
-            </a:r>
-            <a:r>
-              <a:rPr sz="1400" b="1" spc="-75" dirty="0">
-                <a:latin typeface="Verdana"/>
-                <a:cs typeface="Verdana"/>
-              </a:rPr>
-              <a:t> </a:t>
-            </a:r>
-            <a:r>
-              <a:rPr sz="1400" b="1" spc="10" dirty="0">
-                <a:latin typeface="Verdana"/>
-                <a:cs typeface="Verdana"/>
-              </a:rPr>
-              <a:t>Universidade</a:t>
-            </a:r>
-            <a:r>
-              <a:rPr sz="1400" b="1" spc="-160" dirty="0">
-                <a:latin typeface="Verdana"/>
-                <a:cs typeface="Verdana"/>
-              </a:rPr>
-              <a:t> </a:t>
-            </a:r>
-            <a:r>
-              <a:rPr sz="1400" b="1" spc="5" dirty="0">
-                <a:latin typeface="Verdana"/>
-                <a:cs typeface="Verdana"/>
-              </a:rPr>
-              <a:t>do</a:t>
-            </a:r>
-            <a:r>
-              <a:rPr sz="1400" b="1" spc="-40" dirty="0">
-                <a:latin typeface="Verdana"/>
-                <a:cs typeface="Verdana"/>
-              </a:rPr>
-              <a:t> </a:t>
-            </a:r>
-            <a:r>
-              <a:rPr sz="1400" b="1" spc="15" dirty="0">
-                <a:latin typeface="Verdana"/>
-                <a:cs typeface="Verdana"/>
-              </a:rPr>
-              <a:t>Estado</a:t>
-            </a:r>
-            <a:r>
-              <a:rPr sz="1400" b="1" spc="-110" dirty="0">
-                <a:latin typeface="Verdana"/>
-                <a:cs typeface="Verdana"/>
-              </a:rPr>
-              <a:t> </a:t>
-            </a:r>
-            <a:r>
-              <a:rPr sz="1400" b="1" spc="5" dirty="0">
-                <a:latin typeface="Verdana"/>
-                <a:cs typeface="Verdana"/>
-              </a:rPr>
-              <a:t>de  </a:t>
-            </a:r>
-            <a:r>
-              <a:rPr sz="1400" b="1" spc="35" dirty="0">
-                <a:latin typeface="Verdana"/>
-                <a:cs typeface="Verdana"/>
-              </a:rPr>
-              <a:t>Santa</a:t>
-            </a:r>
-            <a:r>
-              <a:rPr sz="1400" b="1" spc="-165" dirty="0">
-                <a:latin typeface="Verdana"/>
-                <a:cs typeface="Verdana"/>
-              </a:rPr>
-              <a:t> </a:t>
-            </a:r>
-            <a:r>
-              <a:rPr sz="1400" b="1" spc="20" dirty="0">
-                <a:latin typeface="Verdana"/>
-                <a:cs typeface="Verdana"/>
-              </a:rPr>
-              <a:t>Catarina</a:t>
-            </a:r>
-            <a:endParaRPr sz="1400">
+              <a:rPr lang="pt-BR" b="1" dirty="0"/>
+              <a:t>[RN-01]</a:t>
+            </a:r>
+            <a:r>
+              <a:rPr lang="pt-BR" dirty="0"/>
+              <a:t> - Tela inicial de cadastro deve informar os campos de nome, porta de acesso e endereço de acesso ao servidor</a:t>
+            </a:r>
+            <a:br>
+              <a:rPr lang="pt-BR" dirty="0"/>
+            </a:br>
+            <a:r>
+              <a:rPr lang="pt-BR" b="1" dirty="0"/>
+              <a:t>[RN-02]</a:t>
+            </a:r>
+            <a:r>
+              <a:rPr lang="pt-BR" dirty="0"/>
+              <a:t> - Na tela de cadastro para entrar no sistema deve informar um pequeno tutorial para entrar no sistema</a:t>
+            </a:r>
+            <a:br>
+              <a:rPr lang="pt-BR" dirty="0"/>
+            </a:br>
+            <a:r>
+              <a:rPr lang="pt-BR" b="1" dirty="0"/>
+              <a:t>[RN-03]</a:t>
+            </a:r>
+            <a:r>
+              <a:rPr lang="pt-BR" dirty="0"/>
+              <a:t> - Na tela de opções de usuários deve ter uma lista de usuários conectados, com os nomes deles com o seu respectivo </a:t>
+            </a:r>
+            <a:r>
+              <a:rPr lang="pt-BR" dirty="0" err="1"/>
+              <a:t>ip</a:t>
+            </a:r>
+            <a:r>
+              <a:rPr lang="pt-BR" dirty="0"/>
+              <a:t>, e também dois botões uma para iniciar a conversa e </a:t>
+            </a:r>
+            <a:r>
+              <a:rPr lang="pt-BR" dirty="0" err="1"/>
+              <a:t>outrar</a:t>
+            </a:r>
+            <a:r>
+              <a:rPr lang="pt-BR" dirty="0"/>
+              <a:t> para atualizar a lista de usuários </a:t>
+            </a:r>
+            <a:r>
+              <a:rPr lang="pt-BR" dirty="0" err="1"/>
+              <a:t>onlines</a:t>
+            </a:r>
+            <a:br>
+              <a:rPr lang="pt-BR" dirty="0"/>
+            </a:br>
+            <a:r>
+              <a:rPr lang="pt-BR" b="1" dirty="0"/>
+              <a:t>[RN-04]</a:t>
+            </a:r>
+            <a:r>
+              <a:rPr lang="pt-BR" dirty="0"/>
+              <a:t> - Sobre a atualização de usuários removidos, se um usuário encerrar a aplicação, o servidor deverá removê-lo da lista de usuários conectados</a:t>
+            </a:r>
+            <a:r>
+              <a:rPr lang="pt-BR" b="1" dirty="0"/>
+              <a:t>(Parcialmente)</a:t>
+            </a:r>
+            <a:endParaRPr sz="1800" b="1" dirty="0">
               <a:latin typeface="Verdana"/>
               <a:cs typeface="Verdana"/>
             </a:endParaRPr>
           </a:p>
-          <a:p>
-            <a:pPr marL="12700" marR="1199515">
-              <a:lnSpc>
-                <a:spcPts val="3379"/>
-              </a:lnSpc>
-              <a:spcBef>
-                <a:spcPts val="350"/>
-              </a:spcBef>
-            </a:pPr>
-            <a:r>
-              <a:rPr sz="1400" spc="10" dirty="0">
-                <a:latin typeface="Verdana"/>
-                <a:cs typeface="Verdana"/>
-                <a:hlinkClick r:id="rId3"/>
-              </a:rPr>
-              <a:t>c</a:t>
-            </a:r>
-            <a:r>
-              <a:rPr sz="1400" spc="45" dirty="0">
-                <a:latin typeface="Verdana"/>
-                <a:cs typeface="Verdana"/>
-                <a:hlinkClick r:id="rId3"/>
-              </a:rPr>
-              <a:t>o</a:t>
-            </a:r>
-            <a:r>
-              <a:rPr sz="1400" spc="15" dirty="0">
-                <a:latin typeface="Verdana"/>
-                <a:cs typeface="Verdana"/>
-                <a:hlinkClick r:id="rId3"/>
-              </a:rPr>
-              <a:t>n</a:t>
-            </a:r>
-            <a:r>
-              <a:rPr sz="1400" spc="-30" dirty="0">
-                <a:latin typeface="Verdana"/>
-                <a:cs typeface="Verdana"/>
-                <a:hlinkClick r:id="rId3"/>
-              </a:rPr>
-              <a:t>t</a:t>
-            </a:r>
-            <a:r>
-              <a:rPr sz="1400" spc="-15" dirty="0">
-                <a:latin typeface="Verdana"/>
-                <a:cs typeface="Verdana"/>
-                <a:hlinkClick r:id="rId3"/>
-              </a:rPr>
-              <a:t>a</a:t>
-            </a:r>
-            <a:r>
-              <a:rPr sz="1400" spc="-30" dirty="0">
-                <a:latin typeface="Verdana"/>
-                <a:cs typeface="Verdana"/>
-                <a:hlinkClick r:id="rId3"/>
-              </a:rPr>
-              <a:t>t</a:t>
-            </a:r>
-            <a:r>
-              <a:rPr sz="1400" spc="45" dirty="0">
-                <a:latin typeface="Verdana"/>
-                <a:cs typeface="Verdana"/>
-                <a:hlinkClick r:id="rId3"/>
-              </a:rPr>
-              <a:t>o</a:t>
-            </a:r>
-            <a:r>
-              <a:rPr sz="1400" spc="10" dirty="0">
-                <a:latin typeface="Verdana"/>
-                <a:cs typeface="Verdana"/>
-                <a:hlinkClick r:id="rId3"/>
-              </a:rPr>
-              <a:t>.u</a:t>
-            </a:r>
-            <a:r>
-              <a:rPr sz="1400" spc="25" dirty="0">
-                <a:latin typeface="Verdana"/>
-                <a:cs typeface="Verdana"/>
-                <a:hlinkClick r:id="rId3"/>
-              </a:rPr>
-              <a:t>d</a:t>
-            </a:r>
-            <a:r>
-              <a:rPr sz="1400" spc="-10" dirty="0">
-                <a:latin typeface="Verdana"/>
-                <a:cs typeface="Verdana"/>
-                <a:hlinkClick r:id="rId3"/>
-              </a:rPr>
-              <a:t>e</a:t>
-            </a:r>
-            <a:r>
-              <a:rPr sz="1400" spc="15" dirty="0">
-                <a:latin typeface="Verdana"/>
-                <a:cs typeface="Verdana"/>
-                <a:hlinkClick r:id="rId3"/>
-              </a:rPr>
-              <a:t>sc@</a:t>
-            </a:r>
-            <a:r>
-              <a:rPr sz="1400" spc="25" dirty="0">
-                <a:latin typeface="Verdana"/>
-                <a:cs typeface="Verdana"/>
-                <a:hlinkClick r:id="rId3"/>
-              </a:rPr>
-              <a:t>g</a:t>
-            </a:r>
-            <a:r>
-              <a:rPr sz="1400" spc="-15" dirty="0">
-                <a:latin typeface="Verdana"/>
-                <a:cs typeface="Verdana"/>
-                <a:hlinkClick r:id="rId3"/>
-              </a:rPr>
-              <a:t>mai</a:t>
-            </a:r>
-            <a:r>
-              <a:rPr sz="1400" spc="60" dirty="0">
-                <a:latin typeface="Verdana"/>
-                <a:cs typeface="Verdana"/>
-                <a:hlinkClick r:id="rId3"/>
-              </a:rPr>
-              <a:t>l</a:t>
-            </a:r>
-            <a:r>
-              <a:rPr sz="1400" spc="-60" dirty="0">
-                <a:latin typeface="Verdana"/>
-                <a:cs typeface="Verdana"/>
-                <a:hlinkClick r:id="rId3"/>
-              </a:rPr>
-              <a:t>.</a:t>
-            </a:r>
-            <a:r>
-              <a:rPr sz="1400" spc="10" dirty="0">
-                <a:latin typeface="Verdana"/>
-                <a:cs typeface="Verdana"/>
-                <a:hlinkClick r:id="rId3"/>
-              </a:rPr>
-              <a:t>c</a:t>
-            </a:r>
-            <a:r>
-              <a:rPr sz="1400" spc="-25" dirty="0">
-                <a:latin typeface="Verdana"/>
-                <a:cs typeface="Verdana"/>
-                <a:hlinkClick r:id="rId3"/>
-              </a:rPr>
-              <a:t>o</a:t>
-            </a:r>
-            <a:r>
-              <a:rPr sz="1400" spc="15" dirty="0">
-                <a:latin typeface="Verdana"/>
-                <a:cs typeface="Verdana"/>
-                <a:hlinkClick r:id="rId3"/>
-              </a:rPr>
-              <a:t>m </a:t>
-            </a:r>
-            <a:r>
-              <a:rPr sz="1400" spc="5" dirty="0">
-                <a:latin typeface="Verdana"/>
-                <a:cs typeface="Verdana"/>
-              </a:rPr>
-              <a:t> </a:t>
-            </a:r>
-            <a:r>
-              <a:rPr sz="1400" spc="15" dirty="0">
-                <a:latin typeface="Verdana"/>
-                <a:cs typeface="Verdana"/>
-                <a:hlinkClick r:id="rId4"/>
-              </a:rPr>
-              <a:t>www.udesc.br</a:t>
-            </a:r>
-            <a:endParaRPr sz="1400">
-              <a:latin typeface="Verdana"/>
-              <a:cs typeface="Verdana"/>
-            </a:endParaRPr>
-          </a:p>
+        </p:txBody>
+      </p:sp>
+      <p:pic>
+        <p:nvPicPr>
+          <p:cNvPr id="6" name="Imagem 5">
+            <a:extLst>
+              <a:ext uri="{FF2B5EF4-FFF2-40B4-BE49-F238E27FC236}">
+                <a16:creationId xmlns:a16="http://schemas.microsoft.com/office/drawing/2014/main" id="{7751186B-BA00-485B-950E-0DA40ACA60EC}"/>
+              </a:ext>
+            </a:extLst>
+          </p:cNvPr>
+          <p:cNvPicPr>
+            <a:picLocks noChangeAspect="1"/>
+          </p:cNvPicPr>
+          <p:nvPr/>
+        </p:nvPicPr>
+        <p:blipFill>
+          <a:blip r:embed="rId3"/>
+          <a:stretch>
+            <a:fillRect/>
+          </a:stretch>
+        </p:blipFill>
+        <p:spPr>
+          <a:xfrm>
+            <a:off x="5562600" y="4568676"/>
+            <a:ext cx="3119438" cy="2108349"/>
+          </a:xfrm>
+          <a:prstGeom prst="rect">
+            <a:avLst/>
+          </a:prstGeom>
+        </p:spPr>
+      </p:pic>
+    </p:spTree>
+    <p:extLst>
+      <p:ext uri="{BB962C8B-B14F-4D97-AF65-F5344CB8AC3E}">
+        <p14:creationId xmlns:p14="http://schemas.microsoft.com/office/powerpoint/2010/main" val="1817070300"/>
+      </p:ext>
+    </p:extLst>
+  </p:cSld>
+  <p:clrMapOvr>
+    <a:masterClrMapping/>
+  </p:clrMapOvr>
+</p:sld>
+</file>
+
+<file path=ppt/slides/slide6.xml><?xml version="1.0" encoding="utf-8"?>
+<p:sld xmlns:a="http://schemas.openxmlformats.org/drawingml/2006/main" xmlns:r="http://schemas.openxmlformats.org/officeDocument/2006/relationships" xmlns:p="http://schemas.openxmlformats.org/presentationml/2006/main">
+  <p:cSld>
+    <p:spTree>
+      <p:nvGrpSpPr>
+        <p:cNvPr id="1" name=""/>
+        <p:cNvGrpSpPr/>
+        <p:nvPr/>
+      </p:nvGrpSpPr>
+      <p:grpSpPr>
+        <a:xfrm>
+          <a:off x="0" y="0"/>
+          <a:ext cx="0" cy="0"/>
+          <a:chOff x="0" y="0"/>
+          <a:chExt cx="0" cy="0"/>
+        </a:xfrm>
+      </p:grpSpPr>
+      <p:sp>
+        <p:nvSpPr>
+          <p:cNvPr id="2" name="object 2"/>
+          <p:cNvSpPr/>
+          <p:nvPr/>
+        </p:nvSpPr>
+        <p:spPr>
+          <a:xfrm>
+            <a:off x="285750" y="6381750"/>
+            <a:ext cx="1676400" cy="295275"/>
+          </a:xfrm>
+          <a:prstGeom prst="rect">
+            <a:avLst/>
+          </a:prstGeom>
+          <a:blipFill>
+            <a:blip r:embed="rId2" cstate="print"/>
+            <a:stretch>
+              <a:fillRect/>
+            </a:stretch>
+          </a:blipFill>
+        </p:spPr>
+        <p:txBody>
+          <a:bodyPr wrap="square" lIns="0" tIns="0" rIns="0" bIns="0" rtlCol="0"/>
+          <a:lstStyle/>
+          <a:p>
+            <a:endParaRPr/>
+          </a:p>
+        </p:txBody>
+      </p:sp>
+      <p:sp>
+        <p:nvSpPr>
+          <p:cNvPr id="3" name="object 3"/>
+          <p:cNvSpPr txBox="1">
+            <a:spLocks noGrp="1"/>
+          </p:cNvSpPr>
+          <p:nvPr>
+            <p:ph type="title"/>
+          </p:nvPr>
+        </p:nvSpPr>
+        <p:spPr>
+          <a:xfrm>
+            <a:off x="472756" y="367030"/>
+            <a:ext cx="8137843" cy="567463"/>
+          </a:xfrm>
+          <a:prstGeom prst="rect">
+            <a:avLst/>
+          </a:prstGeom>
+        </p:spPr>
+        <p:txBody>
+          <a:bodyPr vert="horz" wrap="square" lIns="0" tIns="13335" rIns="0" bIns="0" rtlCol="0">
+            <a:spAutoFit/>
+          </a:bodyPr>
+          <a:lstStyle/>
           <a:p>
             <a:pPr marL="12700">
               <a:lnSpc>
                 <a:spcPct val="100000"/>
               </a:lnSpc>
               <a:spcBef>
-                <a:spcPts val="1230"/>
+                <a:spcPts val="105"/>
               </a:spcBef>
             </a:pPr>
             <a:r>
-              <a:rPr sz="1400" spc="5" dirty="0">
-                <a:latin typeface="Verdana"/>
-                <a:cs typeface="Verdana"/>
-                <a:hlinkClick r:id="rId5"/>
-              </a:rPr>
-              <a:t>www.facebook.com/udesc</a:t>
-            </a:r>
-            <a:endParaRPr sz="1400">
+              <a:rPr lang="pt-BR" sz="3600" spc="-5" dirty="0"/>
+              <a:t>Comunicação com o servidor</a:t>
+            </a:r>
+            <a:endParaRPr sz="3600" dirty="0">
               <a:latin typeface="Verdana"/>
               <a:cs typeface="Verdana"/>
             </a:endParaRPr>
           </a:p>
-          <a:p>
-            <a:pPr>
+        </p:txBody>
+      </p:sp>
+      <p:sp>
+        <p:nvSpPr>
+          <p:cNvPr id="4" name="object 4"/>
+          <p:cNvSpPr/>
+          <p:nvPr/>
+        </p:nvSpPr>
+        <p:spPr>
+          <a:xfrm>
+            <a:off x="0" y="476250"/>
+            <a:ext cx="285750" cy="361950"/>
+          </a:xfrm>
+          <a:custGeom>
+            <a:avLst/>
+            <a:gdLst/>
+            <a:ahLst/>
+            <a:cxnLst/>
+            <a:rect l="l" t="t" r="r" b="b"/>
+            <a:pathLst>
+              <a:path w="285750" h="361950">
+                <a:moveTo>
+                  <a:pt x="0" y="361950"/>
+                </a:moveTo>
+                <a:lnTo>
+                  <a:pt x="285750" y="361950"/>
+                </a:lnTo>
+                <a:lnTo>
+                  <a:pt x="285750" y="0"/>
+                </a:lnTo>
+                <a:lnTo>
+                  <a:pt x="0" y="0"/>
+                </a:lnTo>
+                <a:lnTo>
+                  <a:pt x="0" y="361950"/>
+                </a:lnTo>
+                <a:close/>
+              </a:path>
+            </a:pathLst>
+          </a:custGeom>
+          <a:solidFill>
+            <a:srgbClr val="139B54"/>
+          </a:solidFill>
+        </p:spPr>
+        <p:txBody>
+          <a:bodyPr wrap="square" lIns="0" tIns="0" rIns="0" bIns="0" rtlCol="0"/>
+          <a:lstStyle/>
+          <a:p>
+            <a:endParaRPr/>
+          </a:p>
+        </p:txBody>
+      </p:sp>
+      <p:pic>
+        <p:nvPicPr>
+          <p:cNvPr id="8" name="Imagem 7">
+            <a:extLst>
+              <a:ext uri="{FF2B5EF4-FFF2-40B4-BE49-F238E27FC236}">
+                <a16:creationId xmlns:a16="http://schemas.microsoft.com/office/drawing/2014/main" id="{4AD3C41E-6AFE-4612-B8B9-2AA0C5ACC8B3}"/>
+              </a:ext>
+            </a:extLst>
+          </p:cNvPr>
+          <p:cNvPicPr>
+            <a:picLocks noChangeAspect="1"/>
+          </p:cNvPicPr>
+          <p:nvPr/>
+        </p:nvPicPr>
+        <p:blipFill>
+          <a:blip r:embed="rId3"/>
+          <a:stretch>
+            <a:fillRect/>
+          </a:stretch>
+        </p:blipFill>
+        <p:spPr>
+          <a:xfrm>
+            <a:off x="890587" y="1576387"/>
+            <a:ext cx="7362825" cy="3705225"/>
+          </a:xfrm>
+          <a:prstGeom prst="rect">
+            <a:avLst/>
+          </a:prstGeom>
+        </p:spPr>
+      </p:pic>
+    </p:spTree>
+    <p:extLst>
+      <p:ext uri="{BB962C8B-B14F-4D97-AF65-F5344CB8AC3E}">
+        <p14:creationId xmlns:p14="http://schemas.microsoft.com/office/powerpoint/2010/main" val="223001"/>
+      </p:ext>
+    </p:extLst>
+  </p:cSld>
+  <p:clrMapOvr>
+    <a:masterClrMapping/>
+  </p:clrMapOvr>
+</p:sld>
+</file>
+
+<file path=ppt/slides/slide7.xml><?xml version="1.0" encoding="utf-8"?>
+<p:sld xmlns:a="http://schemas.openxmlformats.org/drawingml/2006/main" xmlns:r="http://schemas.openxmlformats.org/officeDocument/2006/relationships" xmlns:p="http://schemas.openxmlformats.org/presentationml/2006/main">
+  <p:cSld>
+    <p:spTree>
+      <p:nvGrpSpPr>
+        <p:cNvPr id="1" name=""/>
+        <p:cNvGrpSpPr/>
+        <p:nvPr/>
+      </p:nvGrpSpPr>
+      <p:grpSpPr>
+        <a:xfrm>
+          <a:off x="0" y="0"/>
+          <a:ext cx="0" cy="0"/>
+          <a:chOff x="0" y="0"/>
+          <a:chExt cx="0" cy="0"/>
+        </a:xfrm>
+      </p:grpSpPr>
+      <p:sp>
+        <p:nvSpPr>
+          <p:cNvPr id="2" name="object 2"/>
+          <p:cNvSpPr/>
+          <p:nvPr/>
+        </p:nvSpPr>
+        <p:spPr>
+          <a:xfrm>
+            <a:off x="285750" y="6381750"/>
+            <a:ext cx="1676400" cy="295275"/>
+          </a:xfrm>
+          <a:prstGeom prst="rect">
+            <a:avLst/>
+          </a:prstGeom>
+          <a:blipFill>
+            <a:blip r:embed="rId2" cstate="print"/>
+            <a:stretch>
+              <a:fillRect/>
+            </a:stretch>
+          </a:blipFill>
+        </p:spPr>
+        <p:txBody>
+          <a:bodyPr wrap="square" lIns="0" tIns="0" rIns="0" bIns="0" rtlCol="0"/>
+          <a:lstStyle/>
+          <a:p>
+            <a:endParaRPr/>
+          </a:p>
+        </p:txBody>
+      </p:sp>
+      <p:sp>
+        <p:nvSpPr>
+          <p:cNvPr id="3" name="object 3"/>
+          <p:cNvSpPr txBox="1">
+            <a:spLocks noGrp="1"/>
+          </p:cNvSpPr>
+          <p:nvPr>
+            <p:ph type="title"/>
+          </p:nvPr>
+        </p:nvSpPr>
+        <p:spPr>
+          <a:xfrm>
+            <a:off x="472756" y="367030"/>
+            <a:ext cx="8671243" cy="1783180"/>
+          </a:xfrm>
+          <a:prstGeom prst="rect">
+            <a:avLst/>
+          </a:prstGeom>
+        </p:spPr>
+        <p:txBody>
+          <a:bodyPr vert="horz" wrap="square" lIns="0" tIns="13335" rIns="0" bIns="0" rtlCol="0">
+            <a:spAutoFit/>
+          </a:bodyPr>
+          <a:lstStyle/>
+          <a:p>
+            <a:pPr marL="12700" algn="ctr">
+              <a:spcBef>
+                <a:spcPts val="105"/>
+              </a:spcBef>
+            </a:pPr>
+            <a:r>
+              <a:rPr lang="pt-BR" dirty="0"/>
+              <a:t>Especificações mensagens cliente/cliente</a:t>
+            </a:r>
+            <a:br>
+              <a:rPr lang="pt-BR" dirty="0"/>
+            </a:br>
+            <a:endParaRPr sz="3600" dirty="0">
+              <a:latin typeface="Verdana"/>
+              <a:cs typeface="Verdana"/>
+            </a:endParaRPr>
+          </a:p>
+        </p:txBody>
+      </p:sp>
+      <p:sp>
+        <p:nvSpPr>
+          <p:cNvPr id="4" name="object 4"/>
+          <p:cNvSpPr/>
+          <p:nvPr/>
+        </p:nvSpPr>
+        <p:spPr>
+          <a:xfrm>
+            <a:off x="0" y="476250"/>
+            <a:ext cx="285750" cy="361950"/>
+          </a:xfrm>
+          <a:custGeom>
+            <a:avLst/>
+            <a:gdLst/>
+            <a:ahLst/>
+            <a:cxnLst/>
+            <a:rect l="l" t="t" r="r" b="b"/>
+            <a:pathLst>
+              <a:path w="285750" h="361950">
+                <a:moveTo>
+                  <a:pt x="0" y="361950"/>
+                </a:moveTo>
+                <a:lnTo>
+                  <a:pt x="285750" y="361950"/>
+                </a:lnTo>
+                <a:lnTo>
+                  <a:pt x="285750" y="0"/>
+                </a:lnTo>
+                <a:lnTo>
+                  <a:pt x="0" y="0"/>
+                </a:lnTo>
+                <a:lnTo>
+                  <a:pt x="0" y="361950"/>
+                </a:lnTo>
+                <a:close/>
+              </a:path>
+            </a:pathLst>
+          </a:custGeom>
+          <a:solidFill>
+            <a:srgbClr val="139B54"/>
+          </a:solidFill>
+        </p:spPr>
+        <p:txBody>
+          <a:bodyPr wrap="square" lIns="0" tIns="0" rIns="0" bIns="0" rtlCol="0"/>
+          <a:lstStyle/>
+          <a:p>
+            <a:endParaRPr/>
+          </a:p>
+        </p:txBody>
+      </p:sp>
+      <p:sp>
+        <p:nvSpPr>
+          <p:cNvPr id="5" name="object 5"/>
+          <p:cNvSpPr txBox="1"/>
+          <p:nvPr/>
+        </p:nvSpPr>
+        <p:spPr>
+          <a:xfrm>
+            <a:off x="690880" y="1725231"/>
+            <a:ext cx="7609840" cy="290464"/>
+          </a:xfrm>
+          <a:prstGeom prst="rect">
+            <a:avLst/>
+          </a:prstGeom>
+        </p:spPr>
+        <p:txBody>
+          <a:bodyPr vert="horz" wrap="square" lIns="0" tIns="13335" rIns="0" bIns="0" rtlCol="0">
+            <a:spAutoFit/>
+          </a:bodyPr>
+          <a:lstStyle/>
+          <a:p>
+            <a:pPr marL="298450" marR="180340" indent="-286385">
+              <a:lnSpc>
+                <a:spcPct val="99700"/>
+              </a:lnSpc>
+              <a:spcBef>
+                <a:spcPts val="105"/>
+              </a:spcBef>
+              <a:buFont typeface="Arial"/>
+              <a:buChar char="•"/>
+              <a:tabLst>
+                <a:tab pos="298450" algn="l"/>
+                <a:tab pos="299085" algn="l"/>
+              </a:tabLst>
+            </a:pPr>
+            <a:r>
+              <a:rPr lang="pt-BR" sz="1800" dirty="0">
+                <a:latin typeface="Verdana"/>
+                <a:cs typeface="Verdana"/>
+              </a:rPr>
+              <a:t>XXXXXXXXXXXXXXXXXXXXXXXXXXXXXXXXXXXXXXXX</a:t>
+            </a:r>
+            <a:endParaRPr sz="1800" dirty="0">
+              <a:latin typeface="Verdana"/>
+              <a:cs typeface="Verdana"/>
+            </a:endParaRPr>
+          </a:p>
+        </p:txBody>
+      </p:sp>
+    </p:spTree>
+    <p:extLst>
+      <p:ext uri="{BB962C8B-B14F-4D97-AF65-F5344CB8AC3E}">
+        <p14:creationId xmlns:p14="http://schemas.microsoft.com/office/powerpoint/2010/main" val="339669460"/>
+      </p:ext>
+    </p:extLst>
+  </p:cSld>
+  <p:clrMapOvr>
+    <a:masterClrMapping/>
+  </p:clrMapOvr>
+</p:sld>
+</file>
+
+<file path=ppt/slides/slide8.xml><?xml version="1.0" encoding="utf-8"?>
+<p:sld xmlns:a="http://schemas.openxmlformats.org/drawingml/2006/main" xmlns:r="http://schemas.openxmlformats.org/officeDocument/2006/relationships" xmlns:p="http://schemas.openxmlformats.org/presentationml/2006/main">
+  <p:cSld>
+    <p:spTree>
+      <p:nvGrpSpPr>
+        <p:cNvPr id="1" name=""/>
+        <p:cNvGrpSpPr/>
+        <p:nvPr/>
+      </p:nvGrpSpPr>
+      <p:grpSpPr>
+        <a:xfrm>
+          <a:off x="0" y="0"/>
+          <a:ext cx="0" cy="0"/>
+          <a:chOff x="0" y="0"/>
+          <a:chExt cx="0" cy="0"/>
+        </a:xfrm>
+      </p:grpSpPr>
+      <p:sp>
+        <p:nvSpPr>
+          <p:cNvPr id="2" name="object 2"/>
+          <p:cNvSpPr/>
+          <p:nvPr/>
+        </p:nvSpPr>
+        <p:spPr>
+          <a:xfrm>
+            <a:off x="285750" y="6381750"/>
+            <a:ext cx="1676400" cy="295275"/>
+          </a:xfrm>
+          <a:prstGeom prst="rect">
+            <a:avLst/>
+          </a:prstGeom>
+          <a:blipFill>
+            <a:blip r:embed="rId2" cstate="print"/>
+            <a:stretch>
+              <a:fillRect/>
+            </a:stretch>
+          </a:blipFill>
+        </p:spPr>
+        <p:txBody>
+          <a:bodyPr wrap="square" lIns="0" tIns="0" rIns="0" bIns="0" rtlCol="0"/>
+          <a:lstStyle/>
+          <a:p>
+            <a:endParaRPr/>
+          </a:p>
+        </p:txBody>
+      </p:sp>
+      <p:sp>
+        <p:nvSpPr>
+          <p:cNvPr id="3" name="object 3"/>
+          <p:cNvSpPr txBox="1">
+            <a:spLocks noGrp="1"/>
+          </p:cNvSpPr>
+          <p:nvPr>
+            <p:ph type="title"/>
+          </p:nvPr>
+        </p:nvSpPr>
+        <p:spPr>
+          <a:xfrm>
+            <a:off x="472756" y="367030"/>
+            <a:ext cx="8518843" cy="1783180"/>
+          </a:xfrm>
+          <a:prstGeom prst="rect">
+            <a:avLst/>
+          </a:prstGeom>
+        </p:spPr>
+        <p:txBody>
+          <a:bodyPr vert="horz" wrap="square" lIns="0" tIns="13335" rIns="0" bIns="0" rtlCol="0">
+            <a:spAutoFit/>
+          </a:bodyPr>
+          <a:lstStyle/>
+          <a:p>
+            <a:pPr marL="12700" algn="ctr">
+              <a:spcBef>
+                <a:spcPts val="105"/>
+              </a:spcBef>
+            </a:pPr>
+            <a:r>
+              <a:rPr lang="pt-BR" dirty="0"/>
+              <a:t>Especificações mensagens cliente/servidor</a:t>
+            </a:r>
+            <a:br>
+              <a:rPr lang="pt-BR" dirty="0"/>
+            </a:br>
+            <a:endParaRPr sz="3600" dirty="0">
+              <a:latin typeface="Verdana"/>
+              <a:cs typeface="Verdana"/>
+            </a:endParaRPr>
+          </a:p>
+        </p:txBody>
+      </p:sp>
+      <p:sp>
+        <p:nvSpPr>
+          <p:cNvPr id="4" name="object 4"/>
+          <p:cNvSpPr/>
+          <p:nvPr/>
+        </p:nvSpPr>
+        <p:spPr>
+          <a:xfrm>
+            <a:off x="0" y="476250"/>
+            <a:ext cx="285750" cy="361950"/>
+          </a:xfrm>
+          <a:custGeom>
+            <a:avLst/>
+            <a:gdLst/>
+            <a:ahLst/>
+            <a:cxnLst/>
+            <a:rect l="l" t="t" r="r" b="b"/>
+            <a:pathLst>
+              <a:path w="285750" h="361950">
+                <a:moveTo>
+                  <a:pt x="0" y="361950"/>
+                </a:moveTo>
+                <a:lnTo>
+                  <a:pt x="285750" y="361950"/>
+                </a:lnTo>
+                <a:lnTo>
+                  <a:pt x="285750" y="0"/>
+                </a:lnTo>
+                <a:lnTo>
+                  <a:pt x="0" y="0"/>
+                </a:lnTo>
+                <a:lnTo>
+                  <a:pt x="0" y="361950"/>
+                </a:lnTo>
+                <a:close/>
+              </a:path>
+            </a:pathLst>
+          </a:custGeom>
+          <a:solidFill>
+            <a:srgbClr val="139B54"/>
+          </a:solidFill>
+        </p:spPr>
+        <p:txBody>
+          <a:bodyPr wrap="square" lIns="0" tIns="0" rIns="0" bIns="0" rtlCol="0"/>
+          <a:lstStyle/>
+          <a:p>
+            <a:endParaRPr/>
+          </a:p>
+        </p:txBody>
+      </p:sp>
+      <p:sp>
+        <p:nvSpPr>
+          <p:cNvPr id="5" name="object 5"/>
+          <p:cNvSpPr txBox="1"/>
+          <p:nvPr/>
+        </p:nvSpPr>
+        <p:spPr>
+          <a:xfrm>
+            <a:off x="690880" y="1725231"/>
+            <a:ext cx="7609840" cy="290464"/>
+          </a:xfrm>
+          <a:prstGeom prst="rect">
+            <a:avLst/>
+          </a:prstGeom>
+        </p:spPr>
+        <p:txBody>
+          <a:bodyPr vert="horz" wrap="square" lIns="0" tIns="13335" rIns="0" bIns="0" rtlCol="0">
+            <a:spAutoFit/>
+          </a:bodyPr>
+          <a:lstStyle/>
+          <a:p>
+            <a:pPr marL="298450" marR="180340" indent="-286385">
+              <a:lnSpc>
+                <a:spcPct val="99700"/>
+              </a:lnSpc>
+              <a:spcBef>
+                <a:spcPts val="105"/>
+              </a:spcBef>
+              <a:buFont typeface="Arial"/>
+              <a:buChar char="•"/>
+              <a:tabLst>
+                <a:tab pos="298450" algn="l"/>
+                <a:tab pos="299085" algn="l"/>
+              </a:tabLst>
+            </a:pPr>
+            <a:r>
+              <a:rPr lang="pt-BR" sz="1800" dirty="0">
+                <a:latin typeface="Verdana"/>
+                <a:cs typeface="Verdana"/>
+              </a:rPr>
+              <a:t>XXXXXXXXXXXXXXXXXXXXXXXXXXXXXXXXXXXXXXXX</a:t>
+            </a:r>
+            <a:endParaRPr sz="1800" dirty="0">
+              <a:latin typeface="Verdana"/>
+              <a:cs typeface="Verdana"/>
+            </a:endParaRPr>
+          </a:p>
+        </p:txBody>
+      </p:sp>
+    </p:spTree>
+    <p:extLst>
+      <p:ext uri="{BB962C8B-B14F-4D97-AF65-F5344CB8AC3E}">
+        <p14:creationId xmlns:p14="http://schemas.microsoft.com/office/powerpoint/2010/main" val="1445257872"/>
+      </p:ext>
+    </p:extLst>
+  </p:cSld>
+  <p:clrMapOvr>
+    <a:masterClrMapping/>
+  </p:clrMapOvr>
+</p:sld>
+</file>
+
+<file path=ppt/slides/slide9.xml><?xml version="1.0" encoding="utf-8"?>
+<p:sld xmlns:a="http://schemas.openxmlformats.org/drawingml/2006/main" xmlns:r="http://schemas.openxmlformats.org/officeDocument/2006/relationships" xmlns:p="http://schemas.openxmlformats.org/presentationml/2006/main">
+  <p:cSld>
+    <p:spTree>
+      <p:nvGrpSpPr>
+        <p:cNvPr id="1" name=""/>
+        <p:cNvGrpSpPr/>
+        <p:nvPr/>
+      </p:nvGrpSpPr>
+      <p:grpSpPr>
+        <a:xfrm>
+          <a:off x="0" y="0"/>
+          <a:ext cx="0" cy="0"/>
+          <a:chOff x="0" y="0"/>
+          <a:chExt cx="0" cy="0"/>
+        </a:xfrm>
+      </p:grpSpPr>
+      <p:sp>
+        <p:nvSpPr>
+          <p:cNvPr id="2" name="object 2"/>
+          <p:cNvSpPr/>
+          <p:nvPr/>
+        </p:nvSpPr>
+        <p:spPr>
+          <a:xfrm>
+            <a:off x="285750" y="6381750"/>
+            <a:ext cx="1676400" cy="295275"/>
+          </a:xfrm>
+          <a:prstGeom prst="rect">
+            <a:avLst/>
+          </a:prstGeom>
+          <a:blipFill>
+            <a:blip r:embed="rId2" cstate="print"/>
+            <a:stretch>
+              <a:fillRect/>
+            </a:stretch>
+          </a:blipFill>
+        </p:spPr>
+        <p:txBody>
+          <a:bodyPr wrap="square" lIns="0" tIns="0" rIns="0" bIns="0" rtlCol="0"/>
+          <a:lstStyle/>
+          <a:p>
+            <a:endParaRPr/>
+          </a:p>
+        </p:txBody>
+      </p:sp>
+      <p:sp>
+        <p:nvSpPr>
+          <p:cNvPr id="3" name="object 3"/>
+          <p:cNvSpPr txBox="1">
+            <a:spLocks noGrp="1"/>
+          </p:cNvSpPr>
+          <p:nvPr>
+            <p:ph type="title"/>
+          </p:nvPr>
+        </p:nvSpPr>
+        <p:spPr>
+          <a:xfrm>
+            <a:off x="472756" y="367030"/>
+            <a:ext cx="7452043" cy="567463"/>
+          </a:xfrm>
+          <a:prstGeom prst="rect">
+            <a:avLst/>
+          </a:prstGeom>
+        </p:spPr>
+        <p:txBody>
+          <a:bodyPr vert="horz" wrap="square" lIns="0" tIns="13335" rIns="0" bIns="0" rtlCol="0">
+            <a:spAutoFit/>
+          </a:bodyPr>
+          <a:lstStyle/>
+          <a:p>
+            <a:pPr marL="12700">
               <a:lnSpc>
                 <a:spcPct val="100000"/>
               </a:lnSpc>
               <a:spcBef>
-                <a:spcPts val="30"/>
+                <a:spcPts val="105"/>
               </a:spcBef>
             </a:pPr>
-            <a:endParaRPr sz="1450">
-              <a:latin typeface="Times New Roman"/>
-              <a:cs typeface="Times New Roman"/>
-            </a:endParaRPr>
-          </a:p>
-          <a:p>
-            <a:pPr marL="12700">
-              <a:lnSpc>
-                <a:spcPct val="100000"/>
-              </a:lnSpc>
-            </a:pPr>
-            <a:r>
-              <a:rPr sz="1400" spc="15" dirty="0">
-                <a:latin typeface="Verdana"/>
-                <a:cs typeface="Verdana"/>
-              </a:rPr>
-              <a:t>(48)</a:t>
-            </a:r>
-            <a:r>
-              <a:rPr sz="1400" spc="-100" dirty="0">
-                <a:latin typeface="Verdana"/>
-                <a:cs typeface="Verdana"/>
-              </a:rPr>
-              <a:t> </a:t>
-            </a:r>
-            <a:r>
-              <a:rPr sz="1400" spc="10" dirty="0">
-                <a:latin typeface="Verdana"/>
-                <a:cs typeface="Verdana"/>
-              </a:rPr>
-              <a:t>3664-8000</a:t>
-            </a:r>
-            <a:endParaRPr sz="1400">
+            <a:r>
+              <a:rPr lang="pt-BR" sz="3600" spc="-5" dirty="0"/>
+              <a:t>Diagrama de Classes</a:t>
+            </a:r>
+            <a:endParaRPr sz="3600" dirty="0">
               <a:latin typeface="Verdana"/>
               <a:cs typeface="Verdana"/>
             </a:endParaRPr>
           </a:p>
-          <a:p>
-            <a:pPr>
+        </p:txBody>
+      </p:sp>
+      <p:sp>
+        <p:nvSpPr>
+          <p:cNvPr id="4" name="object 4"/>
+          <p:cNvSpPr/>
+          <p:nvPr/>
+        </p:nvSpPr>
+        <p:spPr>
+          <a:xfrm>
+            <a:off x="0" y="476250"/>
+            <a:ext cx="285750" cy="361950"/>
+          </a:xfrm>
+          <a:custGeom>
+            <a:avLst/>
+            <a:gdLst/>
+            <a:ahLst/>
+            <a:cxnLst/>
+            <a:rect l="l" t="t" r="r" b="b"/>
+            <a:pathLst>
+              <a:path w="285750" h="361950">
+                <a:moveTo>
+                  <a:pt x="0" y="361950"/>
+                </a:moveTo>
+                <a:lnTo>
+                  <a:pt x="285750" y="361950"/>
+                </a:lnTo>
+                <a:lnTo>
+                  <a:pt x="285750" y="0"/>
+                </a:lnTo>
+                <a:lnTo>
+                  <a:pt x="0" y="0"/>
+                </a:lnTo>
+                <a:lnTo>
+                  <a:pt x="0" y="361950"/>
+                </a:lnTo>
+                <a:close/>
+              </a:path>
+            </a:pathLst>
+          </a:custGeom>
+          <a:solidFill>
+            <a:srgbClr val="139B54"/>
+          </a:solidFill>
+        </p:spPr>
+        <p:txBody>
+          <a:bodyPr wrap="square" lIns="0" tIns="0" rIns="0" bIns="0" rtlCol="0"/>
+          <a:lstStyle/>
+          <a:p>
+            <a:endParaRPr/>
+          </a:p>
+        </p:txBody>
+      </p:sp>
+      <p:sp>
+        <p:nvSpPr>
+          <p:cNvPr id="5" name="object 5"/>
+          <p:cNvSpPr txBox="1"/>
+          <p:nvPr/>
+        </p:nvSpPr>
+        <p:spPr>
+          <a:xfrm>
+            <a:off x="690880" y="1725231"/>
+            <a:ext cx="7609840" cy="290464"/>
+          </a:xfrm>
+          <a:prstGeom prst="rect">
+            <a:avLst/>
+          </a:prstGeom>
+        </p:spPr>
+        <p:txBody>
+          <a:bodyPr vert="horz" wrap="square" lIns="0" tIns="13335" rIns="0" bIns="0" rtlCol="0">
+            <a:spAutoFit/>
+          </a:bodyPr>
+          <a:lstStyle/>
+          <a:p>
+            <a:pPr marL="298450" marR="180340" indent="-286385">
               <a:lnSpc>
-                <a:spcPct val="100000"/>
+                <a:spcPct val="99700"/>
               </a:lnSpc>
               <a:spcBef>
-                <a:spcPts val="55"/>
+                <a:spcPts val="105"/>
               </a:spcBef>
+              <a:buFont typeface="Arial"/>
+              <a:buChar char="•"/>
+              <a:tabLst>
+                <a:tab pos="298450" algn="l"/>
+                <a:tab pos="299085" algn="l"/>
+              </a:tabLst>
             </a:pPr>
-            <a:endParaRPr sz="1500">
-              <a:latin typeface="Times New Roman"/>
-              <a:cs typeface="Times New Roman"/>
-            </a:endParaRPr>
-          </a:p>
-          <a:p>
-            <a:pPr marL="12700" marR="93345">
-              <a:lnSpc>
-                <a:spcPts val="1650"/>
-              </a:lnSpc>
-            </a:pPr>
-            <a:r>
-              <a:rPr sz="1400" spc="10" dirty="0">
-                <a:latin typeface="Verdana"/>
-                <a:cs typeface="Verdana"/>
-              </a:rPr>
-              <a:t>Rua Madre </a:t>
-            </a:r>
-            <a:r>
-              <a:rPr sz="1400" dirty="0">
-                <a:latin typeface="Verdana"/>
-                <a:cs typeface="Verdana"/>
-              </a:rPr>
-              <a:t>Benvenuta, </a:t>
-            </a:r>
-            <a:r>
-              <a:rPr sz="1400" spc="5" dirty="0">
-                <a:latin typeface="Verdana"/>
-                <a:cs typeface="Verdana"/>
-              </a:rPr>
-              <a:t>2007,</a:t>
-            </a:r>
-            <a:r>
-              <a:rPr sz="1400" spc="-265" dirty="0">
-                <a:latin typeface="Verdana"/>
-                <a:cs typeface="Verdana"/>
-              </a:rPr>
-              <a:t> </a:t>
-            </a:r>
-            <a:r>
-              <a:rPr sz="1400" spc="5" dirty="0">
-                <a:latin typeface="Verdana"/>
-                <a:cs typeface="Verdana"/>
-              </a:rPr>
-              <a:t>Itacorubi  </a:t>
-            </a:r>
-            <a:r>
-              <a:rPr sz="1400" spc="15" dirty="0">
-                <a:latin typeface="Verdana"/>
-                <a:cs typeface="Verdana"/>
-              </a:rPr>
-              <a:t>Florianópolis </a:t>
-            </a:r>
-            <a:r>
-              <a:rPr sz="1400" spc="10" dirty="0">
-                <a:latin typeface="Verdana"/>
-                <a:cs typeface="Verdana"/>
-              </a:rPr>
-              <a:t>-</a:t>
-            </a:r>
-            <a:r>
-              <a:rPr sz="1400" spc="-295" dirty="0">
-                <a:latin typeface="Verdana"/>
-                <a:cs typeface="Verdana"/>
-              </a:rPr>
-              <a:t> </a:t>
-            </a:r>
-            <a:r>
-              <a:rPr sz="1400" spc="10" dirty="0">
-                <a:latin typeface="Verdana"/>
-                <a:cs typeface="Verdana"/>
-              </a:rPr>
-              <a:t>SC</a:t>
-            </a:r>
-            <a:endParaRPr sz="1400">
+            <a:r>
+              <a:rPr lang="pt-BR" sz="1800" dirty="0">
+                <a:latin typeface="Verdana"/>
+                <a:cs typeface="Verdana"/>
+              </a:rPr>
+              <a:t>XXXXXXXXXXXXXXXXXXXXXXXXXXXXXXXXXXXXXXXX</a:t>
+            </a:r>
+            <a:endParaRPr sz="1800" dirty="0">
               <a:latin typeface="Verdana"/>
               <a:cs typeface="Verdana"/>
             </a:endParaRPr>
           </a:p>
-          <a:p>
-            <a:pPr marL="12700">
-              <a:lnSpc>
-                <a:spcPct val="100000"/>
-              </a:lnSpc>
-            </a:pPr>
-            <a:r>
-              <a:rPr sz="1400" spc="5" dirty="0">
-                <a:latin typeface="Verdana"/>
-                <a:cs typeface="Verdana"/>
-              </a:rPr>
-              <a:t>CEP</a:t>
-            </a:r>
-            <a:r>
-              <a:rPr sz="1400" spc="-10" dirty="0">
-                <a:latin typeface="Verdana"/>
-                <a:cs typeface="Verdana"/>
-              </a:rPr>
-              <a:t> </a:t>
-            </a:r>
-            <a:r>
-              <a:rPr sz="1400" spc="10" dirty="0">
-                <a:latin typeface="Verdana"/>
-                <a:cs typeface="Verdana"/>
-              </a:rPr>
-              <a:t>88035-901</a:t>
-            </a:r>
-            <a:endParaRPr sz="1400">
-              <a:latin typeface="Verdana"/>
-              <a:cs typeface="Verdana"/>
-            </a:endParaRPr>
-          </a:p>
-        </p:txBody>
-      </p:sp>
-      <p:sp>
-        <p:nvSpPr>
-          <p:cNvPr id="5" name="object 5"/>
-          <p:cNvSpPr/>
-          <p:nvPr/>
-        </p:nvSpPr>
-        <p:spPr>
-          <a:xfrm>
-            <a:off x="0" y="190500"/>
-            <a:ext cx="4048125" cy="6667500"/>
-          </a:xfrm>
-          <a:prstGeom prst="rect">
-            <a:avLst/>
-          </a:prstGeom>
-          <a:blipFill>
-            <a:blip r:embed="rId6" cstate="print"/>
-            <a:stretch>
-              <a:fillRect/>
-            </a:stretch>
-          </a:blipFill>
-        </p:spPr>
-        <p:txBody>
-          <a:bodyPr wrap="square" lIns="0" tIns="0" rIns="0" bIns="0" rtlCol="0"/>
-          <a:lstStyle/>
-          <a:p>
-            <a:endParaRPr/>
-          </a:p>
         </p:txBody>
       </p:sp>
     </p:spTree>
+    <p:extLst>
+      <p:ext uri="{BB962C8B-B14F-4D97-AF65-F5344CB8AC3E}">
+        <p14:creationId xmlns:p14="http://schemas.microsoft.com/office/powerpoint/2010/main" val="3852708164"/>
+      </p:ext>
+    </p:extLst>
   </p:cSld>
   <p:clrMapOvr>
     <a:masterClrMapping/>

</xml_diff>